<commit_message>
cambio ppt, cambios en py y ipynb
</commit_message>
<xml_diff>
--- a/Presentacion_OpenCV.pptx
+++ b/Presentacion_OpenCV.pptx
@@ -257,10 +257,739 @@
       <p15:sldGuideLst xmlns:p15="http://schemas.microsoft.com/office/powerpoint/2012/main"/>
     </p:ext>
     <p:ext uri="http://customooxmlschemas.google.com/">
-      <go:slidesCustomData xmlns:go="http://customooxmlschemas.google.com/" xmlns:ahyp="http://schemas.microsoft.com/office/drawing/2018/hyperlinkcolor" xmlns:p15="http://schemas.microsoft.com/office/powerpoint/2012/main" xmlns:p14="http://schemas.microsoft.com/office/powerpoint/2010/main" xmlns:com="http://schemas.openxmlformats.org/drawingml/2006/compatibility" xmlns:pvml="urn:schemas-microsoft-com:office:powerpoint" xmlns:v="urn:schemas-microsoft-com:vml" xmlns:o="urn:schemas-microsoft-com:office:office" xmlns:dgm="http://schemas.openxmlformats.org/drawingml/2006/diagram" xmlns:c="http://schemas.openxmlformats.org/drawingml/2006/chart" xmlns:mv="urn:schemas-microsoft-com:mac:vml" xmlns:mc="http://schemas.openxmlformats.org/markup-compatibility/2006" xmlns="" r:id="rId26" roundtripDataSignature="AMtx7mi02RDWfi8lTjsz24NoUUQUySzOHA=="/>
+      <go:slidesCustomData xmlns="" xmlns:mc="http://schemas.openxmlformats.org/markup-compatibility/2006" xmlns:mv="urn:schemas-microsoft-com:mac:vml" xmlns:c="http://schemas.openxmlformats.org/drawingml/2006/chart" xmlns:dgm="http://schemas.openxmlformats.org/drawingml/2006/diagram" xmlns:o="urn:schemas-microsoft-com:office:office" xmlns:v="urn:schemas-microsoft-com:vml" xmlns:pvml="urn:schemas-microsoft-com:office:powerpoint" xmlns:com="http://schemas.openxmlformats.org/drawingml/2006/compatibility" xmlns:p14="http://schemas.microsoft.com/office/powerpoint/2010/main" xmlns:p15="http://schemas.microsoft.com/office/powerpoint/2012/main" xmlns:ahyp="http://schemas.microsoft.com/office/drawing/2018/hyperlinkcolor" xmlns:go="http://customooxmlschemas.google.com/" r:id="rId26" roundtripDataSignature="AMtx7mi02RDWfi8lTjsz24NoUUQUySzOHA=="/>
     </p:ext>
   </p:extLst>
 </p:presentation>
+</file>
+
+<file path=ppt/ink/ink1.xml><?xml version="1.0" encoding="utf-8"?>
+<inkml:ink xmlns:inkml="http://www.w3.org/2003/InkML">
+  <inkml:definitions>
+    <inkml:context xml:id="ctx0">
+      <inkml:inkSource xml:id="inkSrc0">
+        <inkml:traceFormat>
+          <inkml:channel name="X" type="integer" min="-2.14748E9" max="2.14748E9" units="cm"/>
+          <inkml:channel name="Y" type="integer" min="-2.14748E9" max="2.14748E9" units="cm"/>
+          <inkml:channel name="F" type="integer" max="32767" units="dev"/>
+        </inkml:traceFormat>
+        <inkml:channelProperties>
+          <inkml:channelProperty channel="X" name="resolution" value="1000" units="1/cm"/>
+          <inkml:channelProperty channel="Y" name="resolution" value="1000" units="1/cm"/>
+          <inkml:channelProperty channel="F" name="resolution" value="0" units="1/dev"/>
+        </inkml:channelProperties>
+      </inkml:inkSource>
+      <inkml:timestamp xml:id="ts0" timeString="2024-04-23T23:23:32.678"/>
+    </inkml:context>
+    <inkml:brush xml:id="br0">
+      <inkml:brushProperty name="width" value="0.035" units="cm"/>
+      <inkml:brushProperty name="height" value="0.035" units="cm"/>
+    </inkml:brush>
+  </inkml:definitions>
+  <inkml:trace contextRef="#ctx0" brushRef="#br0">723 53 24575,'-530'0'0,"522"1"0,0 0 0,-1 0 0,1 1 0,0 0 0,0 1 0,-14 5 0,14-4 0,-1-1 0,1 0 0,-1 0 0,0-1 0,-18 2 0,19-4 0,5 1 0,-1-1 0,1 1 0,0-1 0,0 0 0,0 0 0,0 0 0,-1-1 0,1 1 0,0-1 0,0 0 0,-6-2 0,9 2 0,0 1 0,1-1 0,-1 0 0,0 0 0,1 1 0,-1-1 0,0 0 0,1 1 0,-1-1 0,1 0 0,-1 1 0,1-1 0,-1 1 0,1-1 0,0 1 0,-1-1 0,1 1 0,-1-1 0,1 1 0,0-1 0,0 1 0,-1 0 0,1-1 0,0 1 0,1 0 0,21-11 0,-2 4 0,1 2 0,0 0 0,0 1 0,0 2 0,43-1 0,-54 3 22,0-1 0,-1-1 0,1 0 0,-1-1 1,19-6-1,30-7-1520,-43 14-5328</inkml:trace>
+</inkml:ink>
+</file>
+
+<file path=ppt/ink/ink10.xml><?xml version="1.0" encoding="utf-8"?>
+<inkml:ink xmlns:inkml="http://www.w3.org/2003/InkML">
+  <inkml:definitions>
+    <inkml:context xml:id="ctx0">
+      <inkml:inkSource xml:id="inkSrc0">
+        <inkml:traceFormat>
+          <inkml:channel name="X" type="integer" min="-2.14748E9" max="2.14748E9" units="cm"/>
+          <inkml:channel name="Y" type="integer" min="-2.14748E9" max="2.14748E9" units="cm"/>
+          <inkml:channel name="F" type="integer" max="32767" units="dev"/>
+        </inkml:traceFormat>
+        <inkml:channelProperties>
+          <inkml:channelProperty channel="X" name="resolution" value="1000" units="1/cm"/>
+          <inkml:channelProperty channel="Y" name="resolution" value="1000" units="1/cm"/>
+          <inkml:channelProperty channel="F" name="resolution" value="0" units="1/dev"/>
+        </inkml:channelProperties>
+      </inkml:inkSource>
+      <inkml:timestamp xml:id="ts0" timeString="2024-04-23T23:23:47.412"/>
+    </inkml:context>
+    <inkml:brush xml:id="br0">
+      <inkml:brushProperty name="width" value="0.35" units="cm"/>
+      <inkml:brushProperty name="height" value="0.35" units="cm"/>
+    </inkml:brush>
+  </inkml:definitions>
+  <inkml:trace contextRef="#ctx0" brushRef="#br0">0 1 24575</inkml:trace>
+</inkml:ink>
+</file>
+
+<file path=ppt/ink/ink11.xml><?xml version="1.0" encoding="utf-8"?>
+<inkml:ink xmlns:inkml="http://www.w3.org/2003/InkML">
+  <inkml:definitions>
+    <inkml:context xml:id="ctx0">
+      <inkml:inkSource xml:id="inkSrc0">
+        <inkml:traceFormat>
+          <inkml:channel name="X" type="integer" min="-2.14748E9" max="2.14748E9" units="cm"/>
+          <inkml:channel name="Y" type="integer" min="-2.14748E9" max="2.14748E9" units="cm"/>
+          <inkml:channel name="F" type="integer" max="32767" units="dev"/>
+        </inkml:traceFormat>
+        <inkml:channelProperties>
+          <inkml:channelProperty channel="X" name="resolution" value="1000" units="1/cm"/>
+          <inkml:channelProperty channel="Y" name="resolution" value="1000" units="1/cm"/>
+          <inkml:channelProperty channel="F" name="resolution" value="0" units="1/dev"/>
+        </inkml:channelProperties>
+      </inkml:inkSource>
+      <inkml:timestamp xml:id="ts0" timeString="2024-04-23T23:23:48.761"/>
+    </inkml:context>
+    <inkml:brush xml:id="br0">
+      <inkml:brushProperty name="width" value="0.35" units="cm"/>
+      <inkml:brushProperty name="height" value="0.35" units="cm"/>
+    </inkml:brush>
+  </inkml:definitions>
+  <inkml:trace contextRef="#ctx0" brushRef="#br0">1 1 24575</inkml:trace>
+</inkml:ink>
+</file>
+
+<file path=ppt/ink/ink12.xml><?xml version="1.0" encoding="utf-8"?>
+<inkml:ink xmlns:inkml="http://www.w3.org/2003/InkML">
+  <inkml:definitions>
+    <inkml:context xml:id="ctx0">
+      <inkml:inkSource xml:id="inkSrc0">
+        <inkml:traceFormat>
+          <inkml:channel name="X" type="integer" min="-2.14748E9" max="2.14748E9" units="cm"/>
+          <inkml:channel name="Y" type="integer" min="-2.14748E9" max="2.14748E9" units="cm"/>
+          <inkml:channel name="F" type="integer" max="32767" units="dev"/>
+        </inkml:traceFormat>
+        <inkml:channelProperties>
+          <inkml:channelProperty channel="X" name="resolution" value="1000" units="1/cm"/>
+          <inkml:channelProperty channel="Y" name="resolution" value="1000" units="1/cm"/>
+          <inkml:channelProperty channel="F" name="resolution" value="0" units="1/dev"/>
+        </inkml:channelProperties>
+      </inkml:inkSource>
+      <inkml:timestamp xml:id="ts0" timeString="2024-04-23T23:23:49.261"/>
+    </inkml:context>
+    <inkml:brush xml:id="br0">
+      <inkml:brushProperty name="width" value="0.35" units="cm"/>
+      <inkml:brushProperty name="height" value="0.35" units="cm"/>
+    </inkml:brush>
+  </inkml:definitions>
+  <inkml:trace contextRef="#ctx0" brushRef="#br0">0 1 24575</inkml:trace>
+</inkml:ink>
+</file>
+
+<file path=ppt/ink/ink13.xml><?xml version="1.0" encoding="utf-8"?>
+<inkml:ink xmlns:inkml="http://www.w3.org/2003/InkML">
+  <inkml:definitions>
+    <inkml:context xml:id="ctx0">
+      <inkml:inkSource xml:id="inkSrc0">
+        <inkml:traceFormat>
+          <inkml:channel name="X" type="integer" min="-2.14748E9" max="2.14748E9" units="cm"/>
+          <inkml:channel name="Y" type="integer" min="-2.14748E9" max="2.14748E9" units="cm"/>
+          <inkml:channel name="F" type="integer" max="32767" units="dev"/>
+        </inkml:traceFormat>
+        <inkml:channelProperties>
+          <inkml:channelProperty channel="X" name="resolution" value="1000" units="1/cm"/>
+          <inkml:channelProperty channel="Y" name="resolution" value="1000" units="1/cm"/>
+          <inkml:channelProperty channel="F" name="resolution" value="0" units="1/dev"/>
+        </inkml:channelProperties>
+      </inkml:inkSource>
+      <inkml:timestamp xml:id="ts0" timeString="2024-04-23T23:23:49.741"/>
+    </inkml:context>
+    <inkml:brush xml:id="br0">
+      <inkml:brushProperty name="width" value="0.35" units="cm"/>
+      <inkml:brushProperty name="height" value="0.35" units="cm"/>
+    </inkml:brush>
+  </inkml:definitions>
+  <inkml:trace contextRef="#ctx0" brushRef="#br0">0 1 24575,'0'0'-8191</inkml:trace>
+</inkml:ink>
+</file>
+
+<file path=ppt/ink/ink14.xml><?xml version="1.0" encoding="utf-8"?>
+<inkml:ink xmlns:inkml="http://www.w3.org/2003/InkML">
+  <inkml:definitions>
+    <inkml:context xml:id="ctx0">
+      <inkml:inkSource xml:id="inkSrc0">
+        <inkml:traceFormat>
+          <inkml:channel name="X" type="integer" min="-2.14748E9" max="2.14748E9" units="cm"/>
+          <inkml:channel name="Y" type="integer" min="-2.14748E9" max="2.14748E9" units="cm"/>
+          <inkml:channel name="F" type="integer" max="32767" units="dev"/>
+        </inkml:traceFormat>
+        <inkml:channelProperties>
+          <inkml:channelProperty channel="X" name="resolution" value="1000" units="1/cm"/>
+          <inkml:channelProperty channel="Y" name="resolution" value="1000" units="1/cm"/>
+          <inkml:channelProperty channel="F" name="resolution" value="0" units="1/dev"/>
+        </inkml:channelProperties>
+      </inkml:inkSource>
+      <inkml:timestamp xml:id="ts0" timeString="2024-04-23T23:23:50.239"/>
+    </inkml:context>
+    <inkml:brush xml:id="br0">
+      <inkml:brushProperty name="width" value="0.35" units="cm"/>
+      <inkml:brushProperty name="height" value="0.35" units="cm"/>
+    </inkml:brush>
+  </inkml:definitions>
+  <inkml:trace contextRef="#ctx0" brushRef="#br0">0 1 24575,'0'0'-8191</inkml:trace>
+</inkml:ink>
+</file>
+
+<file path=ppt/ink/ink15.xml><?xml version="1.0" encoding="utf-8"?>
+<inkml:ink xmlns:inkml="http://www.w3.org/2003/InkML">
+  <inkml:definitions>
+    <inkml:context xml:id="ctx0">
+      <inkml:inkSource xml:id="inkSrc0">
+        <inkml:traceFormat>
+          <inkml:channel name="X" type="integer" min="-2.14748E9" max="2.14748E9" units="cm"/>
+          <inkml:channel name="Y" type="integer" min="-2.14748E9" max="2.14748E9" units="cm"/>
+          <inkml:channel name="F" type="integer" max="32767" units="dev"/>
+        </inkml:traceFormat>
+        <inkml:channelProperties>
+          <inkml:channelProperty channel="X" name="resolution" value="1000" units="1/cm"/>
+          <inkml:channelProperty channel="Y" name="resolution" value="1000" units="1/cm"/>
+          <inkml:channelProperty channel="F" name="resolution" value="0" units="1/dev"/>
+        </inkml:channelProperties>
+      </inkml:inkSource>
+      <inkml:timestamp xml:id="ts0" timeString="2024-04-23T23:23:51.282"/>
+    </inkml:context>
+    <inkml:brush xml:id="br0">
+      <inkml:brushProperty name="width" value="0.35" units="cm"/>
+      <inkml:brushProperty name="height" value="0.35" units="cm"/>
+    </inkml:brush>
+  </inkml:definitions>
+  <inkml:trace contextRef="#ctx0" brushRef="#br0">0 1 24575,'0'0'-8191</inkml:trace>
+</inkml:ink>
+</file>
+
+<file path=ppt/ink/ink16.xml><?xml version="1.0" encoding="utf-8"?>
+<inkml:ink xmlns:inkml="http://www.w3.org/2003/InkML">
+  <inkml:definitions>
+    <inkml:context xml:id="ctx0">
+      <inkml:inkSource xml:id="inkSrc0">
+        <inkml:traceFormat>
+          <inkml:channel name="X" type="integer" min="-2.14748E9" max="2.14748E9" units="cm"/>
+          <inkml:channel name="Y" type="integer" min="-2.14748E9" max="2.14748E9" units="cm"/>
+          <inkml:channel name="F" type="integer" max="32767" units="dev"/>
+        </inkml:traceFormat>
+        <inkml:channelProperties>
+          <inkml:channelProperty channel="X" name="resolution" value="1000" units="1/cm"/>
+          <inkml:channelProperty channel="Y" name="resolution" value="1000" units="1/cm"/>
+          <inkml:channelProperty channel="F" name="resolution" value="0" units="1/dev"/>
+        </inkml:channelProperties>
+      </inkml:inkSource>
+      <inkml:timestamp xml:id="ts0" timeString="2024-04-23T23:23:52.398"/>
+    </inkml:context>
+    <inkml:brush xml:id="br0">
+      <inkml:brushProperty name="width" value="0.35" units="cm"/>
+      <inkml:brushProperty name="height" value="0.35" units="cm"/>
+    </inkml:brush>
+  </inkml:definitions>
+  <inkml:trace contextRef="#ctx0" brushRef="#br0">0 1 24575</inkml:trace>
+</inkml:ink>
+</file>
+
+<file path=ppt/ink/ink17.xml><?xml version="1.0" encoding="utf-8"?>
+<inkml:ink xmlns:inkml="http://www.w3.org/2003/InkML">
+  <inkml:definitions>
+    <inkml:context xml:id="ctx0">
+      <inkml:inkSource xml:id="inkSrc0">
+        <inkml:traceFormat>
+          <inkml:channel name="X" type="integer" min="-2.14748E9" max="2.14748E9" units="cm"/>
+          <inkml:channel name="Y" type="integer" min="-2.14748E9" max="2.14748E9" units="cm"/>
+          <inkml:channel name="F" type="integer" max="32767" units="dev"/>
+        </inkml:traceFormat>
+        <inkml:channelProperties>
+          <inkml:channelProperty channel="X" name="resolution" value="1000" units="1/cm"/>
+          <inkml:channelProperty channel="Y" name="resolution" value="1000" units="1/cm"/>
+          <inkml:channelProperty channel="F" name="resolution" value="0" units="1/dev"/>
+        </inkml:channelProperties>
+      </inkml:inkSource>
+      <inkml:timestamp xml:id="ts0" timeString="2024-04-23T23:23:53.444"/>
+    </inkml:context>
+    <inkml:brush xml:id="br0">
+      <inkml:brushProperty name="width" value="0.35" units="cm"/>
+      <inkml:brushProperty name="height" value="0.35" units="cm"/>
+    </inkml:brush>
+  </inkml:definitions>
+  <inkml:trace contextRef="#ctx0" brushRef="#br0">0 1 24575</inkml:trace>
+</inkml:ink>
+</file>
+
+<file path=ppt/ink/ink18.xml><?xml version="1.0" encoding="utf-8"?>
+<inkml:ink xmlns:inkml="http://www.w3.org/2003/InkML">
+  <inkml:definitions>
+    <inkml:context xml:id="ctx0">
+      <inkml:inkSource xml:id="inkSrc0">
+        <inkml:traceFormat>
+          <inkml:channel name="X" type="integer" min="-2.14748E9" max="2.14748E9" units="cm"/>
+          <inkml:channel name="Y" type="integer" min="-2.14748E9" max="2.14748E9" units="cm"/>
+          <inkml:channel name="F" type="integer" max="32767" units="dev"/>
+        </inkml:traceFormat>
+        <inkml:channelProperties>
+          <inkml:channelProperty channel="X" name="resolution" value="1000" units="1/cm"/>
+          <inkml:channelProperty channel="Y" name="resolution" value="1000" units="1/cm"/>
+          <inkml:channelProperty channel="F" name="resolution" value="0" units="1/dev"/>
+        </inkml:channelProperties>
+      </inkml:inkSource>
+      <inkml:timestamp xml:id="ts0" timeString="2024-04-23T23:23:54.440"/>
+    </inkml:context>
+    <inkml:brush xml:id="br0">
+      <inkml:brushProperty name="width" value="0.35" units="cm"/>
+      <inkml:brushProperty name="height" value="0.35" units="cm"/>
+    </inkml:brush>
+  </inkml:definitions>
+  <inkml:trace contextRef="#ctx0" brushRef="#br0">0 0 24575,'0'0'-8191</inkml:trace>
+</inkml:ink>
+</file>
+
+<file path=ppt/ink/ink19.xml><?xml version="1.0" encoding="utf-8"?>
+<inkml:ink xmlns:inkml="http://www.w3.org/2003/InkML">
+  <inkml:definitions>
+    <inkml:context xml:id="ctx0">
+      <inkml:inkSource xml:id="inkSrc0">
+        <inkml:traceFormat>
+          <inkml:channel name="X" type="integer" min="-2.14748E9" max="2.14748E9" units="cm"/>
+          <inkml:channel name="Y" type="integer" min="-2.14748E9" max="2.14748E9" units="cm"/>
+          <inkml:channel name="F" type="integer" max="32767" units="dev"/>
+        </inkml:traceFormat>
+        <inkml:channelProperties>
+          <inkml:channelProperty channel="X" name="resolution" value="1000" units="1/cm"/>
+          <inkml:channelProperty channel="Y" name="resolution" value="1000" units="1/cm"/>
+          <inkml:channelProperty channel="F" name="resolution" value="0" units="1/dev"/>
+        </inkml:channelProperties>
+      </inkml:inkSource>
+      <inkml:timestamp xml:id="ts0" timeString="2024-04-23T23:23:55.093"/>
+    </inkml:context>
+    <inkml:brush xml:id="br0">
+      <inkml:brushProperty name="width" value="0.35" units="cm"/>
+      <inkml:brushProperty name="height" value="0.35" units="cm"/>
+    </inkml:brush>
+  </inkml:definitions>
+  <inkml:trace contextRef="#ctx0" brushRef="#br0">0 3 24575,'0'-3'0</inkml:trace>
+</inkml:ink>
+</file>
+
+<file path=ppt/ink/ink2.xml><?xml version="1.0" encoding="utf-8"?>
+<inkml:ink xmlns:inkml="http://www.w3.org/2003/InkML">
+  <inkml:definitions>
+    <inkml:context xml:id="ctx0">
+      <inkml:inkSource xml:id="inkSrc0">
+        <inkml:traceFormat>
+          <inkml:channel name="X" type="integer" min="-2.14748E9" max="2.14748E9" units="cm"/>
+          <inkml:channel name="Y" type="integer" min="-2.14748E9" max="2.14748E9" units="cm"/>
+          <inkml:channel name="F" type="integer" max="32767" units="dev"/>
+        </inkml:traceFormat>
+        <inkml:channelProperties>
+          <inkml:channelProperty channel="X" name="resolution" value="1000" units="1/cm"/>
+          <inkml:channelProperty channel="Y" name="resolution" value="1000" units="1/cm"/>
+          <inkml:channelProperty channel="F" name="resolution" value="0" units="1/dev"/>
+        </inkml:channelProperties>
+      </inkml:inkSource>
+      <inkml:timestamp xml:id="ts0" timeString="2024-04-23T23:23:38.136"/>
+    </inkml:context>
+    <inkml:brush xml:id="br0">
+      <inkml:brushProperty name="width" value="0.35" units="cm"/>
+      <inkml:brushProperty name="height" value="0.35" units="cm"/>
+    </inkml:brush>
+  </inkml:definitions>
+  <inkml:trace contextRef="#ctx0" brushRef="#br0">1 1 24575,'0'0'-8191</inkml:trace>
+</inkml:ink>
+</file>
+
+<file path=ppt/ink/ink20.xml><?xml version="1.0" encoding="utf-8"?>
+<inkml:ink xmlns:inkml="http://www.w3.org/2003/InkML">
+  <inkml:definitions>
+    <inkml:context xml:id="ctx0">
+      <inkml:inkSource xml:id="inkSrc0">
+        <inkml:traceFormat>
+          <inkml:channel name="X" type="integer" min="-2.14748E9" max="2.14748E9" units="cm"/>
+          <inkml:channel name="Y" type="integer" min="-2.14748E9" max="2.14748E9" units="cm"/>
+          <inkml:channel name="F" type="integer" max="32767" units="dev"/>
+        </inkml:traceFormat>
+        <inkml:channelProperties>
+          <inkml:channelProperty channel="X" name="resolution" value="1000" units="1/cm"/>
+          <inkml:channelProperty channel="Y" name="resolution" value="1000" units="1/cm"/>
+          <inkml:channelProperty channel="F" name="resolution" value="0" units="1/dev"/>
+        </inkml:channelProperties>
+      </inkml:inkSource>
+      <inkml:timestamp xml:id="ts0" timeString="2024-04-23T23:23:56.162"/>
+    </inkml:context>
+    <inkml:brush xml:id="br0">
+      <inkml:brushProperty name="width" value="0.35" units="cm"/>
+      <inkml:brushProperty name="height" value="0.35" units="cm"/>
+    </inkml:brush>
+  </inkml:definitions>
+  <inkml:trace contextRef="#ctx0" brushRef="#br0">0 1 24575,'0'0'-8191</inkml:trace>
+</inkml:ink>
+</file>
+
+<file path=ppt/ink/ink21.xml><?xml version="1.0" encoding="utf-8"?>
+<inkml:ink xmlns:inkml="http://www.w3.org/2003/InkML">
+  <inkml:definitions>
+    <inkml:context xml:id="ctx0">
+      <inkml:inkSource xml:id="inkSrc0">
+        <inkml:traceFormat>
+          <inkml:channel name="X" type="integer" min="-2.14748E9" max="2.14748E9" units="cm"/>
+          <inkml:channel name="Y" type="integer" min="-2.14748E9" max="2.14748E9" units="cm"/>
+          <inkml:channel name="F" type="integer" max="32767" units="dev"/>
+        </inkml:traceFormat>
+        <inkml:channelProperties>
+          <inkml:channelProperty channel="X" name="resolution" value="1000" units="1/cm"/>
+          <inkml:channelProperty channel="Y" name="resolution" value="1000" units="1/cm"/>
+          <inkml:channelProperty channel="F" name="resolution" value="0" units="1/dev"/>
+        </inkml:channelProperties>
+      </inkml:inkSource>
+      <inkml:timestamp xml:id="ts0" timeString="2024-04-23T23:23:56.860"/>
+    </inkml:context>
+    <inkml:brush xml:id="br0">
+      <inkml:brushProperty name="width" value="0.35" units="cm"/>
+      <inkml:brushProperty name="height" value="0.35" units="cm"/>
+    </inkml:brush>
+  </inkml:definitions>
+  <inkml:trace contextRef="#ctx0" brushRef="#br0">0 1 24575,'0'0'-8191</inkml:trace>
+</inkml:ink>
+</file>
+
+<file path=ppt/ink/ink22.xml><?xml version="1.0" encoding="utf-8"?>
+<inkml:ink xmlns:inkml="http://www.w3.org/2003/InkML">
+  <inkml:definitions>
+    <inkml:context xml:id="ctx0">
+      <inkml:inkSource xml:id="inkSrc0">
+        <inkml:traceFormat>
+          <inkml:channel name="X" type="integer" min="-2.14748E9" max="2.14748E9" units="cm"/>
+          <inkml:channel name="Y" type="integer" min="-2.14748E9" max="2.14748E9" units="cm"/>
+          <inkml:channel name="F" type="integer" max="32767" units="dev"/>
+        </inkml:traceFormat>
+        <inkml:channelProperties>
+          <inkml:channelProperty channel="X" name="resolution" value="1000" units="1/cm"/>
+          <inkml:channelProperty channel="Y" name="resolution" value="1000" units="1/cm"/>
+          <inkml:channelProperty channel="F" name="resolution" value="0" units="1/dev"/>
+        </inkml:channelProperties>
+      </inkml:inkSource>
+      <inkml:timestamp xml:id="ts0" timeString="2024-04-23T23:23:57.915"/>
+    </inkml:context>
+    <inkml:brush xml:id="br0">
+      <inkml:brushProperty name="width" value="0.35" units="cm"/>
+      <inkml:brushProperty name="height" value="0.35" units="cm"/>
+    </inkml:brush>
+  </inkml:definitions>
+  <inkml:trace contextRef="#ctx0" brushRef="#br0">0 1 24575,'0'0'-8191</inkml:trace>
+</inkml:ink>
+</file>
+
+<file path=ppt/ink/ink23.xml><?xml version="1.0" encoding="utf-8"?>
+<inkml:ink xmlns:inkml="http://www.w3.org/2003/InkML">
+  <inkml:definitions>
+    <inkml:context xml:id="ctx0">
+      <inkml:inkSource xml:id="inkSrc0">
+        <inkml:traceFormat>
+          <inkml:channel name="X" type="integer" min="-2.14748E9" max="2.14748E9" units="cm"/>
+          <inkml:channel name="Y" type="integer" min="-2.14748E9" max="2.14748E9" units="cm"/>
+          <inkml:channel name="F" type="integer" max="32767" units="dev"/>
+        </inkml:traceFormat>
+        <inkml:channelProperties>
+          <inkml:channelProperty channel="X" name="resolution" value="1000" units="1/cm"/>
+          <inkml:channelProperty channel="Y" name="resolution" value="1000" units="1/cm"/>
+          <inkml:channelProperty channel="F" name="resolution" value="0" units="1/dev"/>
+        </inkml:channelProperties>
+      </inkml:inkSource>
+      <inkml:timestamp xml:id="ts0" timeString="2024-04-23T23:23:59.237"/>
+    </inkml:context>
+    <inkml:brush xml:id="br0">
+      <inkml:brushProperty name="width" value="0.35" units="cm"/>
+      <inkml:brushProperty name="height" value="0.35" units="cm"/>
+    </inkml:brush>
+  </inkml:definitions>
+  <inkml:trace contextRef="#ctx0" brushRef="#br0">0 1 24575</inkml:trace>
+</inkml:ink>
+</file>
+
+<file path=ppt/ink/ink24.xml><?xml version="1.0" encoding="utf-8"?>
+<inkml:ink xmlns:inkml="http://www.w3.org/2003/InkML">
+  <inkml:definitions>
+    <inkml:context xml:id="ctx0">
+      <inkml:inkSource xml:id="inkSrc0">
+        <inkml:traceFormat>
+          <inkml:channel name="X" type="integer" min="-2.14748E9" max="2.14748E9" units="cm"/>
+          <inkml:channel name="Y" type="integer" min="-2.14748E9" max="2.14748E9" units="cm"/>
+          <inkml:channel name="F" type="integer" max="32767" units="dev"/>
+        </inkml:traceFormat>
+        <inkml:channelProperties>
+          <inkml:channelProperty channel="X" name="resolution" value="1000" units="1/cm"/>
+          <inkml:channelProperty channel="Y" name="resolution" value="1000" units="1/cm"/>
+          <inkml:channelProperty channel="F" name="resolution" value="0" units="1/dev"/>
+        </inkml:channelProperties>
+      </inkml:inkSource>
+      <inkml:timestamp xml:id="ts0" timeString="2024-04-23T23:23:59.985"/>
+    </inkml:context>
+    <inkml:brush xml:id="br0">
+      <inkml:brushProperty name="width" value="0.35" units="cm"/>
+      <inkml:brushProperty name="height" value="0.35" units="cm"/>
+    </inkml:brush>
+  </inkml:definitions>
+  <inkml:trace contextRef="#ctx0" brushRef="#br0">1 3 24575,'0'-3'0</inkml:trace>
+</inkml:ink>
+</file>
+
+<file path=ppt/ink/ink25.xml><?xml version="1.0" encoding="utf-8"?>
+<inkml:ink xmlns:inkml="http://www.w3.org/2003/InkML">
+  <inkml:definitions>
+    <inkml:context xml:id="ctx0">
+      <inkml:inkSource xml:id="inkSrc0">
+        <inkml:traceFormat>
+          <inkml:channel name="X" type="integer" min="-2.14748E9" max="2.14748E9" units="cm"/>
+          <inkml:channel name="Y" type="integer" min="-2.14748E9" max="2.14748E9" units="cm"/>
+          <inkml:channel name="F" type="integer" max="32767" units="dev"/>
+        </inkml:traceFormat>
+        <inkml:channelProperties>
+          <inkml:channelProperty channel="X" name="resolution" value="1000" units="1/cm"/>
+          <inkml:channelProperty channel="Y" name="resolution" value="1000" units="1/cm"/>
+          <inkml:channelProperty channel="F" name="resolution" value="0" units="1/dev"/>
+        </inkml:channelProperties>
+      </inkml:inkSource>
+      <inkml:timestamp xml:id="ts0" timeString="2024-04-23T23:24:00.636"/>
+    </inkml:context>
+    <inkml:brush xml:id="br0">
+      <inkml:brushProperty name="width" value="0.35" units="cm"/>
+      <inkml:brushProperty name="height" value="0.35" units="cm"/>
+    </inkml:brush>
+  </inkml:definitions>
+  <inkml:trace contextRef="#ctx0" brushRef="#br0">0 1 24575,'0'0'-8191</inkml:trace>
+</inkml:ink>
+</file>
+
+<file path=ppt/ink/ink26.xml><?xml version="1.0" encoding="utf-8"?>
+<inkml:ink xmlns:inkml="http://www.w3.org/2003/InkML">
+  <inkml:definitions>
+    <inkml:context xml:id="ctx0">
+      <inkml:inkSource xml:id="inkSrc0">
+        <inkml:traceFormat>
+          <inkml:channel name="X" type="integer" min="-2.14748E9" max="2.14748E9" units="cm"/>
+          <inkml:channel name="Y" type="integer" min="-2.14748E9" max="2.14748E9" units="cm"/>
+          <inkml:channel name="F" type="integer" max="32767" units="dev"/>
+        </inkml:traceFormat>
+        <inkml:channelProperties>
+          <inkml:channelProperty channel="X" name="resolution" value="1000" units="1/cm"/>
+          <inkml:channelProperty channel="Y" name="resolution" value="1000" units="1/cm"/>
+          <inkml:channelProperty channel="F" name="resolution" value="0" units="1/dev"/>
+        </inkml:channelProperties>
+      </inkml:inkSource>
+      <inkml:timestamp xml:id="ts0" timeString="2024-04-23T23:24:01.259"/>
+    </inkml:context>
+    <inkml:brush xml:id="br0">
+      <inkml:brushProperty name="width" value="0.35" units="cm"/>
+      <inkml:brushProperty name="height" value="0.35" units="cm"/>
+    </inkml:brush>
+  </inkml:definitions>
+  <inkml:trace contextRef="#ctx0" brushRef="#br0">1 1 24575,'0'0'-8191</inkml:trace>
+</inkml:ink>
+</file>
+
+<file path=ppt/ink/ink27.xml><?xml version="1.0" encoding="utf-8"?>
+<inkml:ink xmlns:inkml="http://www.w3.org/2003/InkML">
+  <inkml:definitions>
+    <inkml:context xml:id="ctx0">
+      <inkml:inkSource xml:id="inkSrc0">
+        <inkml:traceFormat>
+          <inkml:channel name="X" type="integer" min="-2.14748E9" max="2.14748E9" units="cm"/>
+          <inkml:channel name="Y" type="integer" min="-2.14748E9" max="2.14748E9" units="cm"/>
+          <inkml:channel name="F" type="integer" max="32767" units="dev"/>
+        </inkml:traceFormat>
+        <inkml:channelProperties>
+          <inkml:channelProperty channel="X" name="resolution" value="1000" units="1/cm"/>
+          <inkml:channelProperty channel="Y" name="resolution" value="1000" units="1/cm"/>
+          <inkml:channelProperty channel="F" name="resolution" value="0" units="1/dev"/>
+        </inkml:channelProperties>
+      </inkml:inkSource>
+      <inkml:timestamp xml:id="ts0" timeString="2024-04-23T23:24:01.630"/>
+    </inkml:context>
+    <inkml:brush xml:id="br0">
+      <inkml:brushProperty name="width" value="0.35" units="cm"/>
+      <inkml:brushProperty name="height" value="0.35" units="cm"/>
+    </inkml:brush>
+  </inkml:definitions>
+  <inkml:trace contextRef="#ctx0" brushRef="#br0">1 1 24575,'0'0'-8191</inkml:trace>
+</inkml:ink>
+</file>
+
+<file path=ppt/ink/ink3.xml><?xml version="1.0" encoding="utf-8"?>
+<inkml:ink xmlns:inkml="http://www.w3.org/2003/InkML">
+  <inkml:definitions>
+    <inkml:context xml:id="ctx0">
+      <inkml:inkSource xml:id="inkSrc0">
+        <inkml:traceFormat>
+          <inkml:channel name="X" type="integer" min="-2.14748E9" max="2.14748E9" units="cm"/>
+          <inkml:channel name="Y" type="integer" min="-2.14748E9" max="2.14748E9" units="cm"/>
+          <inkml:channel name="F" type="integer" max="32767" units="dev"/>
+        </inkml:traceFormat>
+        <inkml:channelProperties>
+          <inkml:channelProperty channel="X" name="resolution" value="1000" units="1/cm"/>
+          <inkml:channelProperty channel="Y" name="resolution" value="1000" units="1/cm"/>
+          <inkml:channelProperty channel="F" name="resolution" value="0" units="1/dev"/>
+        </inkml:channelProperties>
+      </inkml:inkSource>
+      <inkml:timestamp xml:id="ts0" timeString="2024-04-23T23:23:41.113"/>
+    </inkml:context>
+    <inkml:brush xml:id="br0">
+      <inkml:brushProperty name="width" value="0.35" units="cm"/>
+      <inkml:brushProperty name="height" value="0.35" units="cm"/>
+    </inkml:brush>
+  </inkml:definitions>
+  <inkml:trace contextRef="#ctx0" brushRef="#br0">1235 3 24575,'-54'-1'0,"22"-1"0,1 2 0,-1 2 0,-56 9 0,32-2 0,44-8 0,-1 1 0,1 0 0,0 1 0,0 0 0,-17 7 0,13-5 0,-1-1 0,1 0 0,-1-2 0,0 0 0,0-1 0,1 0 0,-1-1 0,-25-4 0,-18 1 0,-43 13 0,70-6 0,-42 1 0,-331-6-1365</inkml:trace>
+</inkml:ink>
+</file>
+
+<file path=ppt/ink/ink4.xml><?xml version="1.0" encoding="utf-8"?>
+<inkml:ink xmlns:inkml="http://www.w3.org/2003/InkML">
+  <inkml:definitions>
+    <inkml:context xml:id="ctx0">
+      <inkml:inkSource xml:id="inkSrc0">
+        <inkml:traceFormat>
+          <inkml:channel name="X" type="integer" min="-2.14748E9" max="2.14748E9" units="cm"/>
+          <inkml:channel name="Y" type="integer" min="-2.14748E9" max="2.14748E9" units="cm"/>
+          <inkml:channel name="F" type="integer" max="32767" units="dev"/>
+        </inkml:traceFormat>
+        <inkml:channelProperties>
+          <inkml:channelProperty channel="X" name="resolution" value="1000" units="1/cm"/>
+          <inkml:channelProperty channel="Y" name="resolution" value="1000" units="1/cm"/>
+          <inkml:channelProperty channel="F" name="resolution" value="0" units="1/dev"/>
+        </inkml:channelProperties>
+      </inkml:inkSource>
+      <inkml:timestamp xml:id="ts0" timeString="2024-04-23T23:23:42.458"/>
+    </inkml:context>
+    <inkml:brush xml:id="br0">
+      <inkml:brushProperty name="width" value="0.35" units="cm"/>
+      <inkml:brushProperty name="height" value="0.35" units="cm"/>
+    </inkml:brush>
+  </inkml:definitions>
+  <inkml:trace contextRef="#ctx0" brushRef="#br0">0 1 24575,'0'0'-8191</inkml:trace>
+</inkml:ink>
+</file>
+
+<file path=ppt/ink/ink5.xml><?xml version="1.0" encoding="utf-8"?>
+<inkml:ink xmlns:inkml="http://www.w3.org/2003/InkML">
+  <inkml:definitions>
+    <inkml:context xml:id="ctx0">
+      <inkml:inkSource xml:id="inkSrc0">
+        <inkml:traceFormat>
+          <inkml:channel name="X" type="integer" min="-2.14748E9" max="2.14748E9" units="cm"/>
+          <inkml:channel name="Y" type="integer" min="-2.14748E9" max="2.14748E9" units="cm"/>
+          <inkml:channel name="F" type="integer" max="32767" units="dev"/>
+        </inkml:traceFormat>
+        <inkml:channelProperties>
+          <inkml:channelProperty channel="X" name="resolution" value="1000" units="1/cm"/>
+          <inkml:channelProperty channel="Y" name="resolution" value="1000" units="1/cm"/>
+          <inkml:channelProperty channel="F" name="resolution" value="0" units="1/dev"/>
+        </inkml:channelProperties>
+      </inkml:inkSource>
+      <inkml:timestamp xml:id="ts0" timeString="2024-04-23T23:23:42.802"/>
+    </inkml:context>
+    <inkml:brush xml:id="br0">
+      <inkml:brushProperty name="width" value="0.35" units="cm"/>
+      <inkml:brushProperty name="height" value="0.35" units="cm"/>
+    </inkml:brush>
+  </inkml:definitions>
+  <inkml:trace contextRef="#ctx0" brushRef="#br0">14 0 24575,'-2'0'0,"-2"3"0,-3 1 0</inkml:trace>
+</inkml:ink>
+</file>
+
+<file path=ppt/ink/ink6.xml><?xml version="1.0" encoding="utf-8"?>
+<inkml:ink xmlns:inkml="http://www.w3.org/2003/InkML">
+  <inkml:definitions>
+    <inkml:context xml:id="ctx0">
+      <inkml:inkSource xml:id="inkSrc0">
+        <inkml:traceFormat>
+          <inkml:channel name="X" type="integer" min="-2.14748E9" max="2.14748E9" units="cm"/>
+          <inkml:channel name="Y" type="integer" min="-2.14748E9" max="2.14748E9" units="cm"/>
+          <inkml:channel name="F" type="integer" max="32767" units="dev"/>
+        </inkml:traceFormat>
+        <inkml:channelProperties>
+          <inkml:channelProperty channel="X" name="resolution" value="1000" units="1/cm"/>
+          <inkml:channelProperty channel="Y" name="resolution" value="1000" units="1/cm"/>
+          <inkml:channelProperty channel="F" name="resolution" value="0" units="1/dev"/>
+        </inkml:channelProperties>
+      </inkml:inkSource>
+      <inkml:timestamp xml:id="ts0" timeString="2024-04-23T23:23:43.437"/>
+    </inkml:context>
+    <inkml:brush xml:id="br0">
+      <inkml:brushProperty name="width" value="0.35" units="cm"/>
+      <inkml:brushProperty name="height" value="0.35" units="cm"/>
+    </inkml:brush>
+  </inkml:definitions>
+  <inkml:trace contextRef="#ctx0" brushRef="#br0">0 1 24575,'0'0'-8191</inkml:trace>
+</inkml:ink>
+</file>
+
+<file path=ppt/ink/ink7.xml><?xml version="1.0" encoding="utf-8"?>
+<inkml:ink xmlns:inkml="http://www.w3.org/2003/InkML">
+  <inkml:definitions>
+    <inkml:context xml:id="ctx0">
+      <inkml:inkSource xml:id="inkSrc0">
+        <inkml:traceFormat>
+          <inkml:channel name="X" type="integer" min="-2.14748E9" max="2.14748E9" units="cm"/>
+          <inkml:channel name="Y" type="integer" min="-2.14748E9" max="2.14748E9" units="cm"/>
+          <inkml:channel name="F" type="integer" max="32767" units="dev"/>
+        </inkml:traceFormat>
+        <inkml:channelProperties>
+          <inkml:channelProperty channel="X" name="resolution" value="1000" units="1/cm"/>
+          <inkml:channelProperty channel="Y" name="resolution" value="1000" units="1/cm"/>
+          <inkml:channelProperty channel="F" name="resolution" value="0" units="1/dev"/>
+        </inkml:channelProperties>
+      </inkml:inkSource>
+      <inkml:timestamp xml:id="ts0" timeString="2024-04-23T23:23:44.165"/>
+    </inkml:context>
+    <inkml:brush xml:id="br0">
+      <inkml:brushProperty name="width" value="0.35" units="cm"/>
+      <inkml:brushProperty name="height" value="0.35" units="cm"/>
+    </inkml:brush>
+  </inkml:definitions>
+  <inkml:trace contextRef="#ctx0" brushRef="#br0">0 1 24575,'0'0'-8191</inkml:trace>
+</inkml:ink>
+</file>
+
+<file path=ppt/ink/ink8.xml><?xml version="1.0" encoding="utf-8"?>
+<inkml:ink xmlns:inkml="http://www.w3.org/2003/InkML">
+  <inkml:definitions>
+    <inkml:context xml:id="ctx0">
+      <inkml:inkSource xml:id="inkSrc0">
+        <inkml:traceFormat>
+          <inkml:channel name="X" type="integer" min="-2.14748E9" max="2.14748E9" units="cm"/>
+          <inkml:channel name="Y" type="integer" min="-2.14748E9" max="2.14748E9" units="cm"/>
+          <inkml:channel name="F" type="integer" max="32767" units="dev"/>
+        </inkml:traceFormat>
+        <inkml:channelProperties>
+          <inkml:channelProperty channel="X" name="resolution" value="1000" units="1/cm"/>
+          <inkml:channelProperty channel="Y" name="resolution" value="1000" units="1/cm"/>
+          <inkml:channelProperty channel="F" name="resolution" value="0" units="1/dev"/>
+        </inkml:channelProperties>
+      </inkml:inkSource>
+      <inkml:timestamp xml:id="ts0" timeString="2024-04-23T23:23:44.856"/>
+    </inkml:context>
+    <inkml:brush xml:id="br0">
+      <inkml:brushProperty name="width" value="0.35" units="cm"/>
+      <inkml:brushProperty name="height" value="0.35" units="cm"/>
+    </inkml:brush>
+  </inkml:definitions>
+  <inkml:trace contextRef="#ctx0" brushRef="#br0">0 1 24575,'0'0'-8191</inkml:trace>
+</inkml:ink>
+</file>
+
+<file path=ppt/ink/ink9.xml><?xml version="1.0" encoding="utf-8"?>
+<inkml:ink xmlns:inkml="http://www.w3.org/2003/InkML">
+  <inkml:definitions>
+    <inkml:context xml:id="ctx0">
+      <inkml:inkSource xml:id="inkSrc0">
+        <inkml:traceFormat>
+          <inkml:channel name="X" type="integer" min="-2.14748E9" max="2.14748E9" units="cm"/>
+          <inkml:channel name="Y" type="integer" min="-2.14748E9" max="2.14748E9" units="cm"/>
+          <inkml:channel name="F" type="integer" max="32767" units="dev"/>
+        </inkml:traceFormat>
+        <inkml:channelProperties>
+          <inkml:channelProperty channel="X" name="resolution" value="1000" units="1/cm"/>
+          <inkml:channelProperty channel="Y" name="resolution" value="1000" units="1/cm"/>
+          <inkml:channelProperty channel="F" name="resolution" value="0" units="1/dev"/>
+        </inkml:channelProperties>
+      </inkml:inkSource>
+      <inkml:timestamp xml:id="ts0" timeString="2024-04-23T23:23:45.396"/>
+    </inkml:context>
+    <inkml:brush xml:id="br0">
+      <inkml:brushProperty name="width" value="0.35" units="cm"/>
+      <inkml:brushProperty name="height" value="0.35" units="cm"/>
+    </inkml:brush>
+  </inkml:definitions>
+  <inkml:trace contextRef="#ctx0" brushRef="#br0">0 1 24575,'0'0'-8191</inkml:trace>
+</inkml:ink>
 </file>
 
 <file path=ppt/notesMasters/notesMaster1.xml><?xml version="1.0" encoding="utf-8"?>
@@ -16094,7 +16823,7 @@
         </p:nvSpPr>
         <p:spPr>
           <a:xfrm>
-            <a:off x="2004332" y="2519110"/>
+            <a:off x="1895475" y="1922210"/>
             <a:ext cx="8401049" cy="3539390"/>
           </a:xfrm>
           <a:prstGeom prst="rect">
@@ -17768,7 +18497,7 @@
         </p:nvSpPr>
         <p:spPr>
           <a:xfrm>
-            <a:off x="2004332" y="2468310"/>
+            <a:off x="1895475" y="1763460"/>
             <a:ext cx="8401049" cy="1415732"/>
           </a:xfrm>
           <a:prstGeom prst="rect">
@@ -17843,6 +18572,42 @@
           </a:p>
         </p:txBody>
       </p:sp>
+      <p:pic>
+        <p:nvPicPr>
+          <p:cNvPr id="3" name="Imagen 2" descr="Imagen que contiene persona, hombre, viendo, frente&#10;&#10;Descripción generada automáticamente">
+            <a:extLst>
+              <a:ext uri="{FF2B5EF4-FFF2-40B4-BE49-F238E27FC236}">
+                <a16:creationId xmlns:a16="http://schemas.microsoft.com/office/drawing/2014/main" id="{3C6792A1-9D63-A35A-1100-EA4AC1812E5C}"/>
+              </a:ext>
+            </a:extLst>
+          </p:cNvPr>
+          <p:cNvPicPr>
+            <a:picLocks noChangeAspect="1"/>
+          </p:cNvPicPr>
+          <p:nvPr/>
+        </p:nvPicPr>
+        <p:blipFill>
+          <a:blip r:embed="rId4"/>
+          <a:stretch>
+            <a:fillRect/>
+          </a:stretch>
+        </p:blipFill>
+        <p:spPr>
+          <a:xfrm>
+            <a:off x="3879850" y="3352397"/>
+            <a:ext cx="4432299" cy="2770187"/>
+          </a:xfrm>
+          <a:prstGeom prst="rect">
+            <a:avLst/>
+          </a:prstGeom>
+          <a:ln>
+            <a:noFill/>
+          </a:ln>
+          <a:effectLst>
+            <a:softEdge rad="112500"/>
+          </a:effectLst>
+        </p:spPr>
+      </p:pic>
     </p:spTree>
     <p:extLst>
       <p:ext uri="{BB962C8B-B14F-4D97-AF65-F5344CB8AC3E}">
@@ -18052,7 +18817,7 @@
         </p:nvSpPr>
         <p:spPr>
           <a:xfrm>
-            <a:off x="716902" y="1945561"/>
+            <a:off x="724211" y="2694861"/>
             <a:ext cx="10743578" cy="1569620"/>
           </a:xfrm>
           <a:prstGeom prst="rect">
@@ -18100,186 +18865,6 @@
           </a:p>
         </p:txBody>
       </p:sp>
-      <p:pic>
-        <p:nvPicPr>
-          <p:cNvPr id="7" name="Picture 4">
-            <a:extLst>
-              <a:ext uri="{FF2B5EF4-FFF2-40B4-BE49-F238E27FC236}">
-                <a16:creationId xmlns:a16="http://schemas.microsoft.com/office/drawing/2014/main" id="{D6BA61BA-097C-4DCE-8592-0AA5A571CE42}"/>
-              </a:ext>
-            </a:extLst>
-          </p:cNvPr>
-          <p:cNvPicPr>
-            <a:picLocks noChangeAspect="1" noChangeArrowheads="1"/>
-          </p:cNvPicPr>
-          <p:nvPr/>
-        </p:nvPicPr>
-        <p:blipFill>
-          <a:blip r:embed="rId4">
-            <a:extLst>
-              <a:ext uri="{28A0092B-C50C-407E-A947-70E740481C1C}">
-                <a14:useLocalDpi xmlns:a14="http://schemas.microsoft.com/office/drawing/2010/main" val="0"/>
-              </a:ext>
-            </a:extLst>
-          </a:blip>
-          <a:srcRect/>
-          <a:stretch>
-            <a:fillRect/>
-          </a:stretch>
-        </p:blipFill>
-        <p:spPr bwMode="auto">
-          <a:xfrm>
-            <a:off x="709986" y="4384896"/>
-            <a:ext cx="2774326" cy="2080744"/>
-          </a:xfrm>
-          <a:prstGeom prst="rect">
-            <a:avLst/>
-          </a:prstGeom>
-          <a:noFill/>
-          <a:ln>
-            <a:noFill/>
-          </a:ln>
-          <a:extLst>
-            <a:ext uri="{909E8E84-426E-40DD-AFC4-6F175D3DCCD1}">
-              <a14:hiddenFill xmlns:a14="http://schemas.microsoft.com/office/drawing/2010/main">
-                <a:solidFill>
-                  <a:srgbClr val="FFFFFF"/>
-                </a:solidFill>
-              </a14:hiddenFill>
-            </a:ext>
-            <a:ext uri="{91240B29-F687-4F45-9708-019B960494DF}">
-              <a14:hiddenLine xmlns:a14="http://schemas.microsoft.com/office/drawing/2010/main" w="12700" cap="flat">
-                <a:solidFill>
-                  <a:srgbClr val="000000"/>
-                </a:solidFill>
-                <a:miter lim="800000"/>
-                <a:headEnd/>
-                <a:tailEnd/>
-              </a14:hiddenLine>
-            </a:ext>
-          </a:extLst>
-        </p:spPr>
-      </p:pic>
-      <p:pic>
-        <p:nvPicPr>
-          <p:cNvPr id="8" name="Picture 5">
-            <a:extLst>
-              <a:ext uri="{FF2B5EF4-FFF2-40B4-BE49-F238E27FC236}">
-                <a16:creationId xmlns:a16="http://schemas.microsoft.com/office/drawing/2014/main" id="{19F6E6E8-A021-4FA2-8BAD-CB8E82BE6851}"/>
-              </a:ext>
-            </a:extLst>
-          </p:cNvPr>
-          <p:cNvPicPr>
-            <a:picLocks noChangeAspect="1" noChangeArrowheads="1"/>
-          </p:cNvPicPr>
-          <p:nvPr/>
-        </p:nvPicPr>
-        <p:blipFill>
-          <a:blip r:embed="rId5">
-            <a:extLst>
-              <a:ext uri="{28A0092B-C50C-407E-A947-70E740481C1C}">
-                <a14:useLocalDpi xmlns:a14="http://schemas.microsoft.com/office/drawing/2010/main" val="0"/>
-              </a:ext>
-            </a:extLst>
-          </a:blip>
-          <a:srcRect/>
-          <a:stretch>
-            <a:fillRect/>
-          </a:stretch>
-        </p:blipFill>
-        <p:spPr bwMode="auto">
-          <a:xfrm>
-            <a:off x="4707626" y="4384896"/>
-            <a:ext cx="2774326" cy="2080744"/>
-          </a:xfrm>
-          <a:prstGeom prst="rect">
-            <a:avLst/>
-          </a:prstGeom>
-          <a:noFill/>
-          <a:ln>
-            <a:noFill/>
-          </a:ln>
-          <a:extLst>
-            <a:ext uri="{909E8E84-426E-40DD-AFC4-6F175D3DCCD1}">
-              <a14:hiddenFill xmlns:a14="http://schemas.microsoft.com/office/drawing/2010/main">
-                <a:solidFill>
-                  <a:srgbClr val="FFFFFF"/>
-                </a:solidFill>
-              </a14:hiddenFill>
-            </a:ext>
-            <a:ext uri="{91240B29-F687-4F45-9708-019B960494DF}">
-              <a14:hiddenLine xmlns:a14="http://schemas.microsoft.com/office/drawing/2010/main" w="12700" cap="flat">
-                <a:solidFill>
-                  <a:srgbClr val="000000"/>
-                </a:solidFill>
-                <a:miter lim="800000"/>
-                <a:headEnd/>
-                <a:tailEnd/>
-              </a14:hiddenLine>
-            </a:ext>
-          </a:extLst>
-        </p:spPr>
-      </p:pic>
-      <p:pic>
-        <p:nvPicPr>
-          <p:cNvPr id="9" name="Picture 6">
-            <a:extLst>
-              <a:ext uri="{FF2B5EF4-FFF2-40B4-BE49-F238E27FC236}">
-                <a16:creationId xmlns:a16="http://schemas.microsoft.com/office/drawing/2014/main" id="{9580A349-A075-4678-91D9-32BFB55FEC54}"/>
-              </a:ext>
-            </a:extLst>
-          </p:cNvPr>
-          <p:cNvPicPr>
-            <a:picLocks noChangeAspect="1" noChangeArrowheads="1"/>
-          </p:cNvPicPr>
-          <p:nvPr/>
-        </p:nvPicPr>
-        <p:blipFill>
-          <a:blip r:embed="rId6">
-            <a:extLst>
-              <a:ext uri="{28A0092B-C50C-407E-A947-70E740481C1C}">
-                <a14:useLocalDpi xmlns:a14="http://schemas.microsoft.com/office/drawing/2010/main" val="0"/>
-              </a:ext>
-            </a:extLst>
-          </a:blip>
-          <a:srcRect/>
-          <a:stretch>
-            <a:fillRect/>
-          </a:stretch>
-        </p:blipFill>
-        <p:spPr bwMode="auto">
-          <a:xfrm>
-            <a:off x="8715098" y="4384896"/>
-            <a:ext cx="2774326" cy="2080744"/>
-          </a:xfrm>
-          <a:prstGeom prst="rect">
-            <a:avLst/>
-          </a:prstGeom>
-          <a:noFill/>
-          <a:ln>
-            <a:noFill/>
-          </a:ln>
-          <a:extLst>
-            <a:ext uri="{909E8E84-426E-40DD-AFC4-6F175D3DCCD1}">
-              <a14:hiddenFill xmlns:a14="http://schemas.microsoft.com/office/drawing/2010/main">
-                <a:solidFill>
-                  <a:srgbClr val="FFFFFF"/>
-                </a:solidFill>
-              </a14:hiddenFill>
-            </a:ext>
-            <a:ext uri="{91240B29-F687-4F45-9708-019B960494DF}">
-              <a14:hiddenLine xmlns:a14="http://schemas.microsoft.com/office/drawing/2010/main" w="12700" cap="flat">
-                <a:solidFill>
-                  <a:srgbClr val="000000"/>
-                </a:solidFill>
-                <a:miter lim="800000"/>
-                <a:headEnd/>
-                <a:tailEnd/>
-              </a14:hiddenLine>
-            </a:ext>
-          </a:extLst>
-        </p:spPr>
-      </p:pic>
     </p:spTree>
     <p:extLst>
       <p:ext uri="{BB962C8B-B14F-4D97-AF65-F5344CB8AC3E}">
@@ -18489,7 +19074,7 @@
         </p:nvSpPr>
         <p:spPr>
           <a:xfrm>
-            <a:off x="2004332" y="2468310"/>
+            <a:off x="112032" y="1675221"/>
             <a:ext cx="8401049" cy="3046948"/>
           </a:xfrm>
           <a:prstGeom prst="rect">
@@ -18695,6 +19280,1434 @@
           </a:p>
         </p:txBody>
       </p:sp>
+      <p:pic>
+        <p:nvPicPr>
+          <p:cNvPr id="3" name="Imagen 2" descr="Imagen que contiene persona, foto, sostener, mujer&#10;&#10;Descripción generada automáticamente">
+            <a:extLst>
+              <a:ext uri="{FF2B5EF4-FFF2-40B4-BE49-F238E27FC236}">
+                <a16:creationId xmlns:a16="http://schemas.microsoft.com/office/drawing/2014/main" id="{29DA1859-CC22-48F7-C219-3C5973D08E71}"/>
+              </a:ext>
+            </a:extLst>
+          </p:cNvPr>
+          <p:cNvPicPr>
+            <a:picLocks noChangeAspect="1"/>
+          </p:cNvPicPr>
+          <p:nvPr/>
+        </p:nvPicPr>
+        <p:blipFill>
+          <a:blip r:embed="rId4"/>
+          <a:stretch>
+            <a:fillRect/>
+          </a:stretch>
+        </p:blipFill>
+        <p:spPr>
+          <a:xfrm>
+            <a:off x="7809851" y="2738858"/>
+            <a:ext cx="3810000" cy="3810000"/>
+          </a:xfrm>
+          <a:prstGeom prst="rect">
+            <a:avLst/>
+          </a:prstGeom>
+        </p:spPr>
+      </p:pic>
+      <mc:AlternateContent xmlns:mc="http://schemas.openxmlformats.org/markup-compatibility/2006">
+        <mc:Choice xmlns:p14="http://schemas.microsoft.com/office/powerpoint/2010/main" Requires="p14">
+          <p:contentPart p14:bwMode="auto" r:id="rId5">
+            <p14:nvContentPartPr>
+              <p14:cNvPr id="4" name="Entrada de lápiz 3">
+                <a:extLst>
+                  <a:ext uri="{FF2B5EF4-FFF2-40B4-BE49-F238E27FC236}">
+                    <a16:creationId xmlns:a16="http://schemas.microsoft.com/office/drawing/2014/main" id="{6B13BC77-3FB0-691C-B0A5-A0035EA8FD05}"/>
+                  </a:ext>
+                </a:extLst>
+              </p14:cNvPr>
+              <p14:cNvContentPartPr/>
+              <p14:nvPr/>
+            </p14:nvContentPartPr>
+            <p14:xfrm>
+              <a:off x="10998130" y="6445060"/>
+              <a:ext cx="260640" cy="33480"/>
+            </p14:xfrm>
+          </p:contentPart>
+        </mc:Choice>
+        <mc:Fallback>
+          <p:pic>
+            <p:nvPicPr>
+              <p:cNvPr id="4" name="Entrada de lápiz 3">
+                <a:extLst>
+                  <a:ext uri="{FF2B5EF4-FFF2-40B4-BE49-F238E27FC236}">
+                    <a16:creationId xmlns:a16="http://schemas.microsoft.com/office/drawing/2014/main" id="{6B13BC77-3FB0-691C-B0A5-A0035EA8FD05}"/>
+                  </a:ext>
+                </a:extLst>
+              </p:cNvPr>
+              <p:cNvPicPr/>
+              <p:nvPr/>
+            </p:nvPicPr>
+            <p:blipFill>
+              <a:blip r:embed="rId6"/>
+              <a:stretch>
+                <a:fillRect/>
+              </a:stretch>
+            </p:blipFill>
+            <p:spPr>
+              <a:xfrm>
+                <a:off x="10992010" y="6438940"/>
+                <a:ext cx="272880" cy="45720"/>
+              </a:xfrm>
+              <a:prstGeom prst="rect">
+                <a:avLst/>
+              </a:prstGeom>
+            </p:spPr>
+          </p:pic>
+        </mc:Fallback>
+      </mc:AlternateContent>
+      <p:grpSp>
+        <p:nvGrpSpPr>
+          <p:cNvPr id="40" name="Grupo 39">
+            <a:extLst>
+              <a:ext uri="{FF2B5EF4-FFF2-40B4-BE49-F238E27FC236}">
+                <a16:creationId xmlns:a16="http://schemas.microsoft.com/office/drawing/2014/main" id="{A44CC3FE-C443-A248-67CC-B776DF7F2B77}"/>
+              </a:ext>
+            </a:extLst>
+          </p:cNvPr>
+          <p:cNvGrpSpPr/>
+          <p:nvPr/>
+        </p:nvGrpSpPr>
+        <p:grpSpPr>
+          <a:xfrm>
+            <a:off x="10178770" y="6425980"/>
+            <a:ext cx="1391040" cy="76680"/>
+            <a:chOff x="10178770" y="6425980"/>
+            <a:chExt cx="1391040" cy="76680"/>
+          </a:xfrm>
+        </p:grpSpPr>
+        <mc:AlternateContent xmlns:mc="http://schemas.openxmlformats.org/markup-compatibility/2006">
+          <mc:Choice xmlns:p14="http://schemas.microsoft.com/office/powerpoint/2010/main" Requires="p14">
+            <p:contentPart p14:bwMode="auto" r:id="rId7">
+              <p14:nvContentPartPr>
+                <p14:cNvPr id="5" name="Entrada de lápiz 4">
+                  <a:extLst>
+                    <a:ext uri="{FF2B5EF4-FFF2-40B4-BE49-F238E27FC236}">
+                      <a16:creationId xmlns:a16="http://schemas.microsoft.com/office/drawing/2014/main" id="{928FB746-E550-B86C-E812-F07E2D9081A4}"/>
+                    </a:ext>
+                  </a:extLst>
+                </p14:cNvPr>
+                <p14:cNvContentPartPr/>
+                <p14:nvPr/>
+              </p14:nvContentPartPr>
+              <p14:xfrm>
+                <a:off x="11550370" y="6445060"/>
+                <a:ext cx="360" cy="360"/>
+              </p14:xfrm>
+            </p:contentPart>
+          </mc:Choice>
+          <mc:Fallback>
+            <p:pic>
+              <p:nvPicPr>
+                <p:cNvPr id="5" name="Entrada de lápiz 4">
+                  <a:extLst>
+                    <a:ext uri="{FF2B5EF4-FFF2-40B4-BE49-F238E27FC236}">
+                      <a16:creationId xmlns:a16="http://schemas.microsoft.com/office/drawing/2014/main" id="{928FB746-E550-B86C-E812-F07E2D9081A4}"/>
+                    </a:ext>
+                  </a:extLst>
+                </p:cNvPr>
+                <p:cNvPicPr/>
+                <p:nvPr/>
+              </p:nvPicPr>
+              <p:blipFill>
+                <a:blip r:embed="rId8"/>
+                <a:stretch>
+                  <a:fillRect/>
+                </a:stretch>
+              </p:blipFill>
+              <p:spPr>
+                <a:xfrm>
+                  <a:off x="11487730" y="6382420"/>
+                  <a:ext cx="126000" cy="126000"/>
+                </a:xfrm>
+                <a:prstGeom prst="rect">
+                  <a:avLst/>
+                </a:prstGeom>
+              </p:spPr>
+            </p:pic>
+          </mc:Fallback>
+        </mc:AlternateContent>
+        <mc:AlternateContent xmlns:mc="http://schemas.openxmlformats.org/markup-compatibility/2006">
+          <mc:Choice xmlns:p14="http://schemas.microsoft.com/office/powerpoint/2010/main" Requires="p14">
+            <p:contentPart p14:bwMode="auto" r:id="rId9">
+              <p14:nvContentPartPr>
+                <p14:cNvPr id="7" name="Entrada de lápiz 6">
+                  <a:extLst>
+                    <a:ext uri="{FF2B5EF4-FFF2-40B4-BE49-F238E27FC236}">
+                      <a16:creationId xmlns:a16="http://schemas.microsoft.com/office/drawing/2014/main" id="{F02BB367-851F-5022-4C6F-AD4CF48CEB40}"/>
+                    </a:ext>
+                  </a:extLst>
+                </p14:cNvPr>
+                <p14:cNvContentPartPr/>
+                <p14:nvPr/>
+              </p14:nvContentPartPr>
+              <p14:xfrm>
+                <a:off x="11124850" y="6444340"/>
+                <a:ext cx="444960" cy="26640"/>
+              </p14:xfrm>
+            </p:contentPart>
+          </mc:Choice>
+          <mc:Fallback>
+            <p:pic>
+              <p:nvPicPr>
+                <p:cNvPr id="7" name="Entrada de lápiz 6">
+                  <a:extLst>
+                    <a:ext uri="{FF2B5EF4-FFF2-40B4-BE49-F238E27FC236}">
+                      <a16:creationId xmlns:a16="http://schemas.microsoft.com/office/drawing/2014/main" id="{F02BB367-851F-5022-4C6F-AD4CF48CEB40}"/>
+                    </a:ext>
+                  </a:extLst>
+                </p:cNvPr>
+                <p:cNvPicPr/>
+                <p:nvPr/>
+              </p:nvPicPr>
+              <p:blipFill>
+                <a:blip r:embed="rId10"/>
+                <a:stretch>
+                  <a:fillRect/>
+                </a:stretch>
+              </p:blipFill>
+              <p:spPr>
+                <a:xfrm>
+                  <a:off x="11061850" y="6381340"/>
+                  <a:ext cx="570600" cy="152280"/>
+                </a:xfrm>
+                <a:prstGeom prst="rect">
+                  <a:avLst/>
+                </a:prstGeom>
+              </p:spPr>
+            </p:pic>
+          </mc:Fallback>
+        </mc:AlternateContent>
+        <mc:AlternateContent xmlns:mc="http://schemas.openxmlformats.org/markup-compatibility/2006">
+          <mc:Choice xmlns:p14="http://schemas.microsoft.com/office/powerpoint/2010/main" Requires="p14">
+            <p:contentPart p14:bwMode="auto" r:id="rId11">
+              <p14:nvContentPartPr>
+                <p14:cNvPr id="9" name="Entrada de lápiz 8">
+                  <a:extLst>
+                    <a:ext uri="{FF2B5EF4-FFF2-40B4-BE49-F238E27FC236}">
+                      <a16:creationId xmlns:a16="http://schemas.microsoft.com/office/drawing/2014/main" id="{65EEEBF2-21EE-C8FB-BC96-A2EFEEB8C1DC}"/>
+                    </a:ext>
+                  </a:extLst>
+                </p14:cNvPr>
+                <p14:cNvContentPartPr/>
+                <p14:nvPr/>
+              </p14:nvContentPartPr>
+              <p14:xfrm>
+                <a:off x="11175970" y="6425980"/>
+                <a:ext cx="360" cy="360"/>
+              </p14:xfrm>
+            </p:contentPart>
+          </mc:Choice>
+          <mc:Fallback>
+            <p:pic>
+              <p:nvPicPr>
+                <p:cNvPr id="9" name="Entrada de lápiz 8">
+                  <a:extLst>
+                    <a:ext uri="{FF2B5EF4-FFF2-40B4-BE49-F238E27FC236}">
+                      <a16:creationId xmlns:a16="http://schemas.microsoft.com/office/drawing/2014/main" id="{65EEEBF2-21EE-C8FB-BC96-A2EFEEB8C1DC}"/>
+                    </a:ext>
+                  </a:extLst>
+                </p:cNvPr>
+                <p:cNvPicPr/>
+                <p:nvPr/>
+              </p:nvPicPr>
+              <p:blipFill>
+                <a:blip r:embed="rId8"/>
+                <a:stretch>
+                  <a:fillRect/>
+                </a:stretch>
+              </p:blipFill>
+              <p:spPr>
+                <a:xfrm>
+                  <a:off x="11112970" y="6363340"/>
+                  <a:ext cx="126000" cy="126000"/>
+                </a:xfrm>
+                <a:prstGeom prst="rect">
+                  <a:avLst/>
+                </a:prstGeom>
+              </p:spPr>
+            </p:pic>
+          </mc:Fallback>
+        </mc:AlternateContent>
+        <mc:AlternateContent xmlns:mc="http://schemas.openxmlformats.org/markup-compatibility/2006">
+          <mc:Choice xmlns:p14="http://schemas.microsoft.com/office/powerpoint/2010/main" Requires="p14">
+            <p:contentPart p14:bwMode="auto" r:id="rId12">
+              <p14:nvContentPartPr>
+                <p14:cNvPr id="10" name="Entrada de lápiz 9">
+                  <a:extLst>
+                    <a:ext uri="{FF2B5EF4-FFF2-40B4-BE49-F238E27FC236}">
+                      <a16:creationId xmlns:a16="http://schemas.microsoft.com/office/drawing/2014/main" id="{18B41FDE-DC50-EDE4-23E3-8B0EB08C772C}"/>
+                    </a:ext>
+                  </a:extLst>
+                </p14:cNvPr>
+                <p14:cNvContentPartPr/>
+                <p14:nvPr/>
+              </p14:nvContentPartPr>
+              <p14:xfrm>
+                <a:off x="11145370" y="6432460"/>
+                <a:ext cx="5400" cy="2880"/>
+              </p14:xfrm>
+            </p:contentPart>
+          </mc:Choice>
+          <mc:Fallback>
+            <p:pic>
+              <p:nvPicPr>
+                <p:cNvPr id="10" name="Entrada de lápiz 9">
+                  <a:extLst>
+                    <a:ext uri="{FF2B5EF4-FFF2-40B4-BE49-F238E27FC236}">
+                      <a16:creationId xmlns:a16="http://schemas.microsoft.com/office/drawing/2014/main" id="{18B41FDE-DC50-EDE4-23E3-8B0EB08C772C}"/>
+                    </a:ext>
+                  </a:extLst>
+                </p:cNvPr>
+                <p:cNvPicPr/>
+                <p:nvPr/>
+              </p:nvPicPr>
+              <p:blipFill>
+                <a:blip r:embed="rId13"/>
+                <a:stretch>
+                  <a:fillRect/>
+                </a:stretch>
+              </p:blipFill>
+              <p:spPr>
+                <a:xfrm>
+                  <a:off x="11082730" y="6369460"/>
+                  <a:ext cx="131040" cy="128520"/>
+                </a:xfrm>
+                <a:prstGeom prst="rect">
+                  <a:avLst/>
+                </a:prstGeom>
+              </p:spPr>
+            </p:pic>
+          </mc:Fallback>
+        </mc:AlternateContent>
+        <mc:AlternateContent xmlns:mc="http://schemas.openxmlformats.org/markup-compatibility/2006">
+          <mc:Choice xmlns:p14="http://schemas.microsoft.com/office/powerpoint/2010/main" Requires="p14">
+            <p:contentPart p14:bwMode="auto" r:id="rId14">
+              <p14:nvContentPartPr>
+                <p14:cNvPr id="11" name="Entrada de lápiz 10">
+                  <a:extLst>
+                    <a:ext uri="{FF2B5EF4-FFF2-40B4-BE49-F238E27FC236}">
+                      <a16:creationId xmlns:a16="http://schemas.microsoft.com/office/drawing/2014/main" id="{42A68EDF-0AB8-4BA5-D720-E3E384F8391A}"/>
+                    </a:ext>
+                  </a:extLst>
+                </p14:cNvPr>
+                <p14:cNvContentPartPr/>
+                <p14:nvPr/>
+              </p14:nvContentPartPr>
+              <p14:xfrm>
+                <a:off x="11048890" y="6476740"/>
+                <a:ext cx="360" cy="360"/>
+              </p14:xfrm>
+            </p:contentPart>
+          </mc:Choice>
+          <mc:Fallback>
+            <p:pic>
+              <p:nvPicPr>
+                <p:cNvPr id="11" name="Entrada de lápiz 10">
+                  <a:extLst>
+                    <a:ext uri="{FF2B5EF4-FFF2-40B4-BE49-F238E27FC236}">
+                      <a16:creationId xmlns:a16="http://schemas.microsoft.com/office/drawing/2014/main" id="{42A68EDF-0AB8-4BA5-D720-E3E384F8391A}"/>
+                    </a:ext>
+                  </a:extLst>
+                </p:cNvPr>
+                <p:cNvPicPr/>
+                <p:nvPr/>
+              </p:nvPicPr>
+              <p:blipFill>
+                <a:blip r:embed="rId8"/>
+                <a:stretch>
+                  <a:fillRect/>
+                </a:stretch>
+              </p:blipFill>
+              <p:spPr>
+                <a:xfrm>
+                  <a:off x="10985890" y="6414100"/>
+                  <a:ext cx="126000" cy="126000"/>
+                </a:xfrm>
+                <a:prstGeom prst="rect">
+                  <a:avLst/>
+                </a:prstGeom>
+              </p:spPr>
+            </p:pic>
+          </mc:Fallback>
+        </mc:AlternateContent>
+        <mc:AlternateContent xmlns:mc="http://schemas.openxmlformats.org/markup-compatibility/2006">
+          <mc:Choice xmlns:p14="http://schemas.microsoft.com/office/powerpoint/2010/main" Requires="p14">
+            <p:contentPart p14:bwMode="auto" r:id="rId15">
+              <p14:nvContentPartPr>
+                <p14:cNvPr id="12" name="Entrada de lápiz 11">
+                  <a:extLst>
+                    <a:ext uri="{FF2B5EF4-FFF2-40B4-BE49-F238E27FC236}">
+                      <a16:creationId xmlns:a16="http://schemas.microsoft.com/office/drawing/2014/main" id="{F22475B6-73CB-1DD1-50FC-8E9280DDE124}"/>
+                    </a:ext>
+                  </a:extLst>
+                </p14:cNvPr>
+                <p14:cNvContentPartPr/>
+                <p14:nvPr/>
+              </p14:nvContentPartPr>
+              <p14:xfrm>
+                <a:off x="10998130" y="6476740"/>
+                <a:ext cx="360" cy="360"/>
+              </p14:xfrm>
+            </p:contentPart>
+          </mc:Choice>
+          <mc:Fallback>
+            <p:pic>
+              <p:nvPicPr>
+                <p:cNvPr id="12" name="Entrada de lápiz 11">
+                  <a:extLst>
+                    <a:ext uri="{FF2B5EF4-FFF2-40B4-BE49-F238E27FC236}">
+                      <a16:creationId xmlns:a16="http://schemas.microsoft.com/office/drawing/2014/main" id="{F22475B6-73CB-1DD1-50FC-8E9280DDE124}"/>
+                    </a:ext>
+                  </a:extLst>
+                </p:cNvPr>
+                <p:cNvPicPr/>
+                <p:nvPr/>
+              </p:nvPicPr>
+              <p:blipFill>
+                <a:blip r:embed="rId8"/>
+                <a:stretch>
+                  <a:fillRect/>
+                </a:stretch>
+              </p:blipFill>
+              <p:spPr>
+                <a:xfrm>
+                  <a:off x="10935130" y="6414100"/>
+                  <a:ext cx="126000" cy="126000"/>
+                </a:xfrm>
+                <a:prstGeom prst="rect">
+                  <a:avLst/>
+                </a:prstGeom>
+              </p:spPr>
+            </p:pic>
+          </mc:Fallback>
+        </mc:AlternateContent>
+        <mc:AlternateContent xmlns:mc="http://schemas.openxmlformats.org/markup-compatibility/2006">
+          <mc:Choice xmlns:p14="http://schemas.microsoft.com/office/powerpoint/2010/main" Requires="p14">
+            <p:contentPart p14:bwMode="auto" r:id="rId16">
+              <p14:nvContentPartPr>
+                <p14:cNvPr id="13" name="Entrada de lápiz 12">
+                  <a:extLst>
+                    <a:ext uri="{FF2B5EF4-FFF2-40B4-BE49-F238E27FC236}">
+                      <a16:creationId xmlns:a16="http://schemas.microsoft.com/office/drawing/2014/main" id="{7E8856F8-8C3A-DA96-3573-02DF3ABE5EB4}"/>
+                    </a:ext>
+                  </a:extLst>
+                </p14:cNvPr>
+                <p14:cNvContentPartPr/>
+                <p14:nvPr/>
+              </p14:nvContentPartPr>
+              <p14:xfrm>
+                <a:off x="10940890" y="6476740"/>
+                <a:ext cx="360" cy="360"/>
+              </p14:xfrm>
+            </p:contentPart>
+          </mc:Choice>
+          <mc:Fallback>
+            <p:pic>
+              <p:nvPicPr>
+                <p:cNvPr id="13" name="Entrada de lápiz 12">
+                  <a:extLst>
+                    <a:ext uri="{FF2B5EF4-FFF2-40B4-BE49-F238E27FC236}">
+                      <a16:creationId xmlns:a16="http://schemas.microsoft.com/office/drawing/2014/main" id="{7E8856F8-8C3A-DA96-3573-02DF3ABE5EB4}"/>
+                    </a:ext>
+                  </a:extLst>
+                </p:cNvPr>
+                <p:cNvPicPr/>
+                <p:nvPr/>
+              </p:nvPicPr>
+              <p:blipFill>
+                <a:blip r:embed="rId8"/>
+                <a:stretch>
+                  <a:fillRect/>
+                </a:stretch>
+              </p:blipFill>
+              <p:spPr>
+                <a:xfrm>
+                  <a:off x="10877890" y="6414100"/>
+                  <a:ext cx="126000" cy="126000"/>
+                </a:xfrm>
+                <a:prstGeom prst="rect">
+                  <a:avLst/>
+                </a:prstGeom>
+              </p:spPr>
+            </p:pic>
+          </mc:Fallback>
+        </mc:AlternateContent>
+        <mc:AlternateContent xmlns:mc="http://schemas.openxmlformats.org/markup-compatibility/2006">
+          <mc:Choice xmlns:p14="http://schemas.microsoft.com/office/powerpoint/2010/main" Requires="p14">
+            <p:contentPart p14:bwMode="auto" r:id="rId17">
+              <p14:nvContentPartPr>
+                <p14:cNvPr id="14" name="Entrada de lápiz 13">
+                  <a:extLst>
+                    <a:ext uri="{FF2B5EF4-FFF2-40B4-BE49-F238E27FC236}">
+                      <a16:creationId xmlns:a16="http://schemas.microsoft.com/office/drawing/2014/main" id="{A759590D-E36A-BC1D-F59F-FD16C91FD817}"/>
+                    </a:ext>
+                  </a:extLst>
+                </p14:cNvPr>
+                <p14:cNvContentPartPr/>
+                <p14:nvPr/>
+              </p14:nvContentPartPr>
+              <p14:xfrm>
+                <a:off x="10909210" y="6476740"/>
+                <a:ext cx="360" cy="360"/>
+              </p14:xfrm>
+            </p:contentPart>
+          </mc:Choice>
+          <mc:Fallback>
+            <p:pic>
+              <p:nvPicPr>
+                <p:cNvPr id="14" name="Entrada de lápiz 13">
+                  <a:extLst>
+                    <a:ext uri="{FF2B5EF4-FFF2-40B4-BE49-F238E27FC236}">
+                      <a16:creationId xmlns:a16="http://schemas.microsoft.com/office/drawing/2014/main" id="{A759590D-E36A-BC1D-F59F-FD16C91FD817}"/>
+                    </a:ext>
+                  </a:extLst>
+                </p:cNvPr>
+                <p:cNvPicPr/>
+                <p:nvPr/>
+              </p:nvPicPr>
+              <p:blipFill>
+                <a:blip r:embed="rId8"/>
+                <a:stretch>
+                  <a:fillRect/>
+                </a:stretch>
+              </p:blipFill>
+              <p:spPr>
+                <a:xfrm>
+                  <a:off x="10846210" y="6414100"/>
+                  <a:ext cx="126000" cy="126000"/>
+                </a:xfrm>
+                <a:prstGeom prst="rect">
+                  <a:avLst/>
+                </a:prstGeom>
+              </p:spPr>
+            </p:pic>
+          </mc:Fallback>
+        </mc:AlternateContent>
+        <mc:AlternateContent xmlns:mc="http://schemas.openxmlformats.org/markup-compatibility/2006">
+          <mc:Choice xmlns:p14="http://schemas.microsoft.com/office/powerpoint/2010/main" Requires="p14">
+            <p:contentPart p14:bwMode="auto" r:id="rId18">
+              <p14:nvContentPartPr>
+                <p14:cNvPr id="16" name="Entrada de lápiz 15">
+                  <a:extLst>
+                    <a:ext uri="{FF2B5EF4-FFF2-40B4-BE49-F238E27FC236}">
+                      <a16:creationId xmlns:a16="http://schemas.microsoft.com/office/drawing/2014/main" id="{B5022C94-3761-DFD6-A4A0-283478BA23D8}"/>
+                    </a:ext>
+                  </a:extLst>
+                </p14:cNvPr>
+                <p14:cNvContentPartPr/>
+                <p14:nvPr/>
+              </p14:nvContentPartPr>
+              <p14:xfrm>
+                <a:off x="10820290" y="6483220"/>
+                <a:ext cx="360" cy="360"/>
+              </p14:xfrm>
+            </p:contentPart>
+          </mc:Choice>
+          <mc:Fallback>
+            <p:pic>
+              <p:nvPicPr>
+                <p:cNvPr id="16" name="Entrada de lápiz 15">
+                  <a:extLst>
+                    <a:ext uri="{FF2B5EF4-FFF2-40B4-BE49-F238E27FC236}">
+                      <a16:creationId xmlns:a16="http://schemas.microsoft.com/office/drawing/2014/main" id="{B5022C94-3761-DFD6-A4A0-283478BA23D8}"/>
+                    </a:ext>
+                  </a:extLst>
+                </p:cNvPr>
+                <p:cNvPicPr/>
+                <p:nvPr/>
+              </p:nvPicPr>
+              <p:blipFill>
+                <a:blip r:embed="rId8"/>
+                <a:stretch>
+                  <a:fillRect/>
+                </a:stretch>
+              </p:blipFill>
+              <p:spPr>
+                <a:xfrm>
+                  <a:off x="10757290" y="6420580"/>
+                  <a:ext cx="126000" cy="126000"/>
+                </a:xfrm>
+                <a:prstGeom prst="rect">
+                  <a:avLst/>
+                </a:prstGeom>
+              </p:spPr>
+            </p:pic>
+          </mc:Fallback>
+        </mc:AlternateContent>
+        <mc:AlternateContent xmlns:mc="http://schemas.openxmlformats.org/markup-compatibility/2006">
+          <mc:Choice xmlns:p14="http://schemas.microsoft.com/office/powerpoint/2010/main" Requires="p14">
+            <p:contentPart p14:bwMode="auto" r:id="rId19">
+              <p14:nvContentPartPr>
+                <p14:cNvPr id="18" name="Entrada de lápiz 17">
+                  <a:extLst>
+                    <a:ext uri="{FF2B5EF4-FFF2-40B4-BE49-F238E27FC236}">
+                      <a16:creationId xmlns:a16="http://schemas.microsoft.com/office/drawing/2014/main" id="{B50409D7-E037-668C-8B89-207B1F9C2FBA}"/>
+                    </a:ext>
+                  </a:extLst>
+                </p14:cNvPr>
+                <p14:cNvContentPartPr/>
+                <p14:nvPr/>
+              </p14:nvContentPartPr>
+              <p14:xfrm>
+                <a:off x="10743970" y="6483220"/>
+                <a:ext cx="360" cy="360"/>
+              </p14:xfrm>
+            </p:contentPart>
+          </mc:Choice>
+          <mc:Fallback>
+            <p:pic>
+              <p:nvPicPr>
+                <p:cNvPr id="18" name="Entrada de lápiz 17">
+                  <a:extLst>
+                    <a:ext uri="{FF2B5EF4-FFF2-40B4-BE49-F238E27FC236}">
+                      <a16:creationId xmlns:a16="http://schemas.microsoft.com/office/drawing/2014/main" id="{B50409D7-E037-668C-8B89-207B1F9C2FBA}"/>
+                    </a:ext>
+                  </a:extLst>
+                </p:cNvPr>
+                <p:cNvPicPr/>
+                <p:nvPr/>
+              </p:nvPicPr>
+              <p:blipFill>
+                <a:blip r:embed="rId8"/>
+                <a:stretch>
+                  <a:fillRect/>
+                </a:stretch>
+              </p:blipFill>
+              <p:spPr>
+                <a:xfrm>
+                  <a:off x="10681330" y="6420580"/>
+                  <a:ext cx="126000" cy="126000"/>
+                </a:xfrm>
+                <a:prstGeom prst="rect">
+                  <a:avLst/>
+                </a:prstGeom>
+              </p:spPr>
+            </p:pic>
+          </mc:Fallback>
+        </mc:AlternateContent>
+        <mc:AlternateContent xmlns:mc="http://schemas.openxmlformats.org/markup-compatibility/2006">
+          <mc:Choice xmlns:p14="http://schemas.microsoft.com/office/powerpoint/2010/main" Requires="p14">
+            <p:contentPart p14:bwMode="auto" r:id="rId20">
+              <p14:nvContentPartPr>
+                <p14:cNvPr id="19" name="Entrada de lápiz 18">
+                  <a:extLst>
+                    <a:ext uri="{FF2B5EF4-FFF2-40B4-BE49-F238E27FC236}">
+                      <a16:creationId xmlns:a16="http://schemas.microsoft.com/office/drawing/2014/main" id="{0E419103-4375-670C-7C52-75620004DD57}"/>
+                    </a:ext>
+                  </a:extLst>
+                </p14:cNvPr>
+                <p14:cNvContentPartPr/>
+                <p14:nvPr/>
+              </p14:nvContentPartPr>
+              <p14:xfrm>
+                <a:off x="10718770" y="6483220"/>
+                <a:ext cx="360" cy="360"/>
+              </p14:xfrm>
+            </p:contentPart>
+          </mc:Choice>
+          <mc:Fallback>
+            <p:pic>
+              <p:nvPicPr>
+                <p:cNvPr id="19" name="Entrada de lápiz 18">
+                  <a:extLst>
+                    <a:ext uri="{FF2B5EF4-FFF2-40B4-BE49-F238E27FC236}">
+                      <a16:creationId xmlns:a16="http://schemas.microsoft.com/office/drawing/2014/main" id="{0E419103-4375-670C-7C52-75620004DD57}"/>
+                    </a:ext>
+                  </a:extLst>
+                </p:cNvPr>
+                <p:cNvPicPr/>
+                <p:nvPr/>
+              </p:nvPicPr>
+              <p:blipFill>
+                <a:blip r:embed="rId8"/>
+                <a:stretch>
+                  <a:fillRect/>
+                </a:stretch>
+              </p:blipFill>
+              <p:spPr>
+                <a:xfrm>
+                  <a:off x="10655770" y="6420580"/>
+                  <a:ext cx="126000" cy="126000"/>
+                </a:xfrm>
+                <a:prstGeom prst="rect">
+                  <a:avLst/>
+                </a:prstGeom>
+              </p:spPr>
+            </p:pic>
+          </mc:Fallback>
+        </mc:AlternateContent>
+        <mc:AlternateContent xmlns:mc="http://schemas.openxmlformats.org/markup-compatibility/2006">
+          <mc:Choice xmlns:p14="http://schemas.microsoft.com/office/powerpoint/2010/main" Requires="p14">
+            <p:contentPart p14:bwMode="auto" r:id="rId21">
+              <p14:nvContentPartPr>
+                <p14:cNvPr id="20" name="Entrada de lápiz 19">
+                  <a:extLst>
+                    <a:ext uri="{FF2B5EF4-FFF2-40B4-BE49-F238E27FC236}">
+                      <a16:creationId xmlns:a16="http://schemas.microsoft.com/office/drawing/2014/main" id="{18AE4EC9-4EA0-AFF5-D421-CFE86C8A4535}"/>
+                    </a:ext>
+                  </a:extLst>
+                </p14:cNvPr>
+                <p14:cNvContentPartPr/>
+                <p14:nvPr/>
+              </p14:nvContentPartPr>
+              <p14:xfrm>
+                <a:off x="10680610" y="6489340"/>
+                <a:ext cx="360" cy="360"/>
+              </p14:xfrm>
+            </p:contentPart>
+          </mc:Choice>
+          <mc:Fallback>
+            <p:pic>
+              <p:nvPicPr>
+                <p:cNvPr id="20" name="Entrada de lápiz 19">
+                  <a:extLst>
+                    <a:ext uri="{FF2B5EF4-FFF2-40B4-BE49-F238E27FC236}">
+                      <a16:creationId xmlns:a16="http://schemas.microsoft.com/office/drawing/2014/main" id="{18AE4EC9-4EA0-AFF5-D421-CFE86C8A4535}"/>
+                    </a:ext>
+                  </a:extLst>
+                </p:cNvPr>
+                <p:cNvPicPr/>
+                <p:nvPr/>
+              </p:nvPicPr>
+              <p:blipFill>
+                <a:blip r:embed="rId8"/>
+                <a:stretch>
+                  <a:fillRect/>
+                </a:stretch>
+              </p:blipFill>
+              <p:spPr>
+                <a:xfrm>
+                  <a:off x="10617610" y="6426700"/>
+                  <a:ext cx="126000" cy="126000"/>
+                </a:xfrm>
+                <a:prstGeom prst="rect">
+                  <a:avLst/>
+                </a:prstGeom>
+              </p:spPr>
+            </p:pic>
+          </mc:Fallback>
+        </mc:AlternateContent>
+        <mc:AlternateContent xmlns:mc="http://schemas.openxmlformats.org/markup-compatibility/2006">
+          <mc:Choice xmlns:p14="http://schemas.microsoft.com/office/powerpoint/2010/main" Requires="p14">
+            <p:contentPart p14:bwMode="auto" r:id="rId22">
+              <p14:nvContentPartPr>
+                <p14:cNvPr id="21" name="Entrada de lápiz 20">
+                  <a:extLst>
+                    <a:ext uri="{FF2B5EF4-FFF2-40B4-BE49-F238E27FC236}">
+                      <a16:creationId xmlns:a16="http://schemas.microsoft.com/office/drawing/2014/main" id="{EEF3DB4A-292D-F356-A46A-1B0D8FA4F82D}"/>
+                    </a:ext>
+                  </a:extLst>
+                </p14:cNvPr>
+                <p14:cNvContentPartPr/>
+                <p14:nvPr/>
+              </p14:nvContentPartPr>
+              <p14:xfrm>
+                <a:off x="10661530" y="6489340"/>
+                <a:ext cx="360" cy="360"/>
+              </p14:xfrm>
+            </p:contentPart>
+          </mc:Choice>
+          <mc:Fallback>
+            <p:pic>
+              <p:nvPicPr>
+                <p:cNvPr id="21" name="Entrada de lápiz 20">
+                  <a:extLst>
+                    <a:ext uri="{FF2B5EF4-FFF2-40B4-BE49-F238E27FC236}">
+                      <a16:creationId xmlns:a16="http://schemas.microsoft.com/office/drawing/2014/main" id="{EEF3DB4A-292D-F356-A46A-1B0D8FA4F82D}"/>
+                    </a:ext>
+                  </a:extLst>
+                </p:cNvPr>
+                <p:cNvPicPr/>
+                <p:nvPr/>
+              </p:nvPicPr>
+              <p:blipFill>
+                <a:blip r:embed="rId8"/>
+                <a:stretch>
+                  <a:fillRect/>
+                </a:stretch>
+              </p:blipFill>
+              <p:spPr>
+                <a:xfrm>
+                  <a:off x="10598530" y="6426700"/>
+                  <a:ext cx="126000" cy="126000"/>
+                </a:xfrm>
+                <a:prstGeom prst="rect">
+                  <a:avLst/>
+                </a:prstGeom>
+              </p:spPr>
+            </p:pic>
+          </mc:Fallback>
+        </mc:AlternateContent>
+        <mc:AlternateContent xmlns:mc="http://schemas.openxmlformats.org/markup-compatibility/2006">
+          <mc:Choice xmlns:p14="http://schemas.microsoft.com/office/powerpoint/2010/main" Requires="p14">
+            <p:contentPart p14:bwMode="auto" r:id="rId23">
+              <p14:nvContentPartPr>
+                <p14:cNvPr id="22" name="Entrada de lápiz 21">
+                  <a:extLst>
+                    <a:ext uri="{FF2B5EF4-FFF2-40B4-BE49-F238E27FC236}">
+                      <a16:creationId xmlns:a16="http://schemas.microsoft.com/office/drawing/2014/main" id="{D0169A3E-0B6A-C9F2-525E-2847D08857F4}"/>
+                    </a:ext>
+                  </a:extLst>
+                </p14:cNvPr>
+                <p14:cNvContentPartPr/>
+                <p14:nvPr/>
+              </p14:nvContentPartPr>
+              <p14:xfrm>
+                <a:off x="10629850" y="6483220"/>
+                <a:ext cx="360" cy="360"/>
+              </p14:xfrm>
+            </p:contentPart>
+          </mc:Choice>
+          <mc:Fallback>
+            <p:pic>
+              <p:nvPicPr>
+                <p:cNvPr id="22" name="Entrada de lápiz 21">
+                  <a:extLst>
+                    <a:ext uri="{FF2B5EF4-FFF2-40B4-BE49-F238E27FC236}">
+                      <a16:creationId xmlns:a16="http://schemas.microsoft.com/office/drawing/2014/main" id="{D0169A3E-0B6A-C9F2-525E-2847D08857F4}"/>
+                    </a:ext>
+                  </a:extLst>
+                </p:cNvPr>
+                <p:cNvPicPr/>
+                <p:nvPr/>
+              </p:nvPicPr>
+              <p:blipFill>
+                <a:blip r:embed="rId8"/>
+                <a:stretch>
+                  <a:fillRect/>
+                </a:stretch>
+              </p:blipFill>
+              <p:spPr>
+                <a:xfrm>
+                  <a:off x="10566850" y="6420580"/>
+                  <a:ext cx="126000" cy="126000"/>
+                </a:xfrm>
+                <a:prstGeom prst="rect">
+                  <a:avLst/>
+                </a:prstGeom>
+              </p:spPr>
+            </p:pic>
+          </mc:Fallback>
+        </mc:AlternateContent>
+        <mc:AlternateContent xmlns:mc="http://schemas.openxmlformats.org/markup-compatibility/2006">
+          <mc:Choice xmlns:p14="http://schemas.microsoft.com/office/powerpoint/2010/main" Requires="p14">
+            <p:contentPart p14:bwMode="auto" r:id="rId24">
+              <p14:nvContentPartPr>
+                <p14:cNvPr id="24" name="Entrada de lápiz 23">
+                  <a:extLst>
+                    <a:ext uri="{FF2B5EF4-FFF2-40B4-BE49-F238E27FC236}">
+                      <a16:creationId xmlns:a16="http://schemas.microsoft.com/office/drawing/2014/main" id="{DAF88CC2-BFDE-1AD3-F001-50B30B6AA417}"/>
+                    </a:ext>
+                  </a:extLst>
+                </p14:cNvPr>
+                <p14:cNvContentPartPr/>
+                <p14:nvPr/>
+              </p14:nvContentPartPr>
+              <p14:xfrm>
+                <a:off x="10560010" y="6495820"/>
+                <a:ext cx="360" cy="360"/>
+              </p14:xfrm>
+            </p:contentPart>
+          </mc:Choice>
+          <mc:Fallback>
+            <p:pic>
+              <p:nvPicPr>
+                <p:cNvPr id="24" name="Entrada de lápiz 23">
+                  <a:extLst>
+                    <a:ext uri="{FF2B5EF4-FFF2-40B4-BE49-F238E27FC236}">
+                      <a16:creationId xmlns:a16="http://schemas.microsoft.com/office/drawing/2014/main" id="{DAF88CC2-BFDE-1AD3-F001-50B30B6AA417}"/>
+                    </a:ext>
+                  </a:extLst>
+                </p:cNvPr>
+                <p:cNvPicPr/>
+                <p:nvPr/>
+              </p:nvPicPr>
+              <p:blipFill>
+                <a:blip r:embed="rId8"/>
+                <a:stretch>
+                  <a:fillRect/>
+                </a:stretch>
+              </p:blipFill>
+              <p:spPr>
+                <a:xfrm>
+                  <a:off x="10497010" y="6433180"/>
+                  <a:ext cx="126000" cy="126000"/>
+                </a:xfrm>
+                <a:prstGeom prst="rect">
+                  <a:avLst/>
+                </a:prstGeom>
+              </p:spPr>
+            </p:pic>
+          </mc:Fallback>
+        </mc:AlternateContent>
+        <mc:AlternateContent xmlns:mc="http://schemas.openxmlformats.org/markup-compatibility/2006">
+          <mc:Choice xmlns:p14="http://schemas.microsoft.com/office/powerpoint/2010/main" Requires="p14">
+            <p:contentPart p14:bwMode="auto" r:id="rId25">
+              <p14:nvContentPartPr>
+                <p14:cNvPr id="25" name="Entrada de lápiz 24">
+                  <a:extLst>
+                    <a:ext uri="{FF2B5EF4-FFF2-40B4-BE49-F238E27FC236}">
+                      <a16:creationId xmlns:a16="http://schemas.microsoft.com/office/drawing/2014/main" id="{74920118-9611-36EE-F36D-FDF5D399C826}"/>
+                    </a:ext>
+                  </a:extLst>
+                </p14:cNvPr>
+                <p14:cNvContentPartPr/>
+                <p14:nvPr/>
+              </p14:nvContentPartPr>
+              <p14:xfrm>
+                <a:off x="10521850" y="6495820"/>
+                <a:ext cx="360" cy="360"/>
+              </p14:xfrm>
+            </p:contentPart>
+          </mc:Choice>
+          <mc:Fallback>
+            <p:pic>
+              <p:nvPicPr>
+                <p:cNvPr id="25" name="Entrada de lápiz 24">
+                  <a:extLst>
+                    <a:ext uri="{FF2B5EF4-FFF2-40B4-BE49-F238E27FC236}">
+                      <a16:creationId xmlns:a16="http://schemas.microsoft.com/office/drawing/2014/main" id="{74920118-9611-36EE-F36D-FDF5D399C826}"/>
+                    </a:ext>
+                  </a:extLst>
+                </p:cNvPr>
+                <p:cNvPicPr/>
+                <p:nvPr/>
+              </p:nvPicPr>
+              <p:blipFill>
+                <a:blip r:embed="rId8"/>
+                <a:stretch>
+                  <a:fillRect/>
+                </a:stretch>
+              </p:blipFill>
+              <p:spPr>
+                <a:xfrm>
+                  <a:off x="10458850" y="6433180"/>
+                  <a:ext cx="126000" cy="126000"/>
+                </a:xfrm>
+                <a:prstGeom prst="rect">
+                  <a:avLst/>
+                </a:prstGeom>
+              </p:spPr>
+            </p:pic>
+          </mc:Fallback>
+        </mc:AlternateContent>
+        <mc:AlternateContent xmlns:mc="http://schemas.openxmlformats.org/markup-compatibility/2006">
+          <mc:Choice xmlns:p14="http://schemas.microsoft.com/office/powerpoint/2010/main" Requires="p14">
+            <p:contentPart p14:bwMode="auto" r:id="rId26">
+              <p14:nvContentPartPr>
+                <p14:cNvPr id="27" name="Entrada de lápiz 26">
+                  <a:extLst>
+                    <a:ext uri="{FF2B5EF4-FFF2-40B4-BE49-F238E27FC236}">
+                      <a16:creationId xmlns:a16="http://schemas.microsoft.com/office/drawing/2014/main" id="{283A8BC8-F4E0-74F2-0BD1-CB2B9FA4ACE1}"/>
+                    </a:ext>
+                  </a:extLst>
+                </p14:cNvPr>
+                <p14:cNvContentPartPr/>
+                <p14:nvPr/>
+              </p14:nvContentPartPr>
+              <p14:xfrm>
+                <a:off x="10477570" y="6502300"/>
+                <a:ext cx="360" cy="360"/>
+              </p14:xfrm>
+            </p:contentPart>
+          </mc:Choice>
+          <mc:Fallback>
+            <p:pic>
+              <p:nvPicPr>
+                <p:cNvPr id="27" name="Entrada de lápiz 26">
+                  <a:extLst>
+                    <a:ext uri="{FF2B5EF4-FFF2-40B4-BE49-F238E27FC236}">
+                      <a16:creationId xmlns:a16="http://schemas.microsoft.com/office/drawing/2014/main" id="{283A8BC8-F4E0-74F2-0BD1-CB2B9FA4ACE1}"/>
+                    </a:ext>
+                  </a:extLst>
+                </p:cNvPr>
+                <p:cNvPicPr/>
+                <p:nvPr/>
+              </p:nvPicPr>
+              <p:blipFill>
+                <a:blip r:embed="rId8"/>
+                <a:stretch>
+                  <a:fillRect/>
+                </a:stretch>
+              </p:blipFill>
+              <p:spPr>
+                <a:xfrm>
+                  <a:off x="10414570" y="6439300"/>
+                  <a:ext cx="126000" cy="126000"/>
+                </a:xfrm>
+                <a:prstGeom prst="rect">
+                  <a:avLst/>
+                </a:prstGeom>
+              </p:spPr>
+            </p:pic>
+          </mc:Fallback>
+        </mc:AlternateContent>
+        <mc:AlternateContent xmlns:mc="http://schemas.openxmlformats.org/markup-compatibility/2006">
+          <mc:Choice xmlns:p14="http://schemas.microsoft.com/office/powerpoint/2010/main" Requires="p14">
+            <p:contentPart p14:bwMode="auto" r:id="rId27">
+              <p14:nvContentPartPr>
+                <p14:cNvPr id="28" name="Entrada de lápiz 27">
+                  <a:extLst>
+                    <a:ext uri="{FF2B5EF4-FFF2-40B4-BE49-F238E27FC236}">
+                      <a16:creationId xmlns:a16="http://schemas.microsoft.com/office/drawing/2014/main" id="{A6AD8BC1-6099-2891-BF95-8C98E36B8F20}"/>
+                    </a:ext>
+                  </a:extLst>
+                </p14:cNvPr>
+                <p14:cNvContentPartPr/>
+                <p14:nvPr/>
+              </p14:nvContentPartPr>
+              <p14:xfrm>
+                <a:off x="10452010" y="6501220"/>
+                <a:ext cx="360" cy="1440"/>
+              </p14:xfrm>
+            </p:contentPart>
+          </mc:Choice>
+          <mc:Fallback>
+            <p:pic>
+              <p:nvPicPr>
+                <p:cNvPr id="28" name="Entrada de lápiz 27">
+                  <a:extLst>
+                    <a:ext uri="{FF2B5EF4-FFF2-40B4-BE49-F238E27FC236}">
+                      <a16:creationId xmlns:a16="http://schemas.microsoft.com/office/drawing/2014/main" id="{A6AD8BC1-6099-2891-BF95-8C98E36B8F20}"/>
+                    </a:ext>
+                  </a:extLst>
+                </p:cNvPr>
+                <p:cNvPicPr/>
+                <p:nvPr/>
+              </p:nvPicPr>
+              <p:blipFill>
+                <a:blip r:embed="rId28"/>
+                <a:stretch>
+                  <a:fillRect/>
+                </a:stretch>
+              </p:blipFill>
+              <p:spPr>
+                <a:xfrm>
+                  <a:off x="10389010" y="6438220"/>
+                  <a:ext cx="126000" cy="127080"/>
+                </a:xfrm>
+                <a:prstGeom prst="rect">
+                  <a:avLst/>
+                </a:prstGeom>
+              </p:spPr>
+            </p:pic>
+          </mc:Fallback>
+        </mc:AlternateContent>
+        <mc:AlternateContent xmlns:mc="http://schemas.openxmlformats.org/markup-compatibility/2006">
+          <mc:Choice xmlns:p14="http://schemas.microsoft.com/office/powerpoint/2010/main" Requires="p14">
+            <p:contentPart p14:bwMode="auto" r:id="rId29">
+              <p14:nvContentPartPr>
+                <p14:cNvPr id="30" name="Entrada de lápiz 29">
+                  <a:extLst>
+                    <a:ext uri="{FF2B5EF4-FFF2-40B4-BE49-F238E27FC236}">
+                      <a16:creationId xmlns:a16="http://schemas.microsoft.com/office/drawing/2014/main" id="{33B01F47-384A-74A6-F75F-A87E17AD3346}"/>
+                    </a:ext>
+                  </a:extLst>
+                </p14:cNvPr>
+                <p14:cNvContentPartPr/>
+                <p14:nvPr/>
+              </p14:nvContentPartPr>
+              <p14:xfrm>
+                <a:off x="10471090" y="6483220"/>
+                <a:ext cx="360" cy="360"/>
+              </p14:xfrm>
+            </p:contentPart>
+          </mc:Choice>
+          <mc:Fallback>
+            <p:pic>
+              <p:nvPicPr>
+                <p:cNvPr id="30" name="Entrada de lápiz 29">
+                  <a:extLst>
+                    <a:ext uri="{FF2B5EF4-FFF2-40B4-BE49-F238E27FC236}">
+                      <a16:creationId xmlns:a16="http://schemas.microsoft.com/office/drawing/2014/main" id="{33B01F47-384A-74A6-F75F-A87E17AD3346}"/>
+                    </a:ext>
+                  </a:extLst>
+                </p:cNvPr>
+                <p:cNvPicPr/>
+                <p:nvPr/>
+              </p:nvPicPr>
+              <p:blipFill>
+                <a:blip r:embed="rId8"/>
+                <a:stretch>
+                  <a:fillRect/>
+                </a:stretch>
+              </p:blipFill>
+              <p:spPr>
+                <a:xfrm>
+                  <a:off x="10408090" y="6420580"/>
+                  <a:ext cx="126000" cy="126000"/>
+                </a:xfrm>
+                <a:prstGeom prst="rect">
+                  <a:avLst/>
+                </a:prstGeom>
+              </p:spPr>
+            </p:pic>
+          </mc:Fallback>
+        </mc:AlternateContent>
+        <mc:AlternateContent xmlns:mc="http://schemas.openxmlformats.org/markup-compatibility/2006">
+          <mc:Choice xmlns:p14="http://schemas.microsoft.com/office/powerpoint/2010/main" Requires="p14">
+            <p:contentPart p14:bwMode="auto" r:id="rId30">
+              <p14:nvContentPartPr>
+                <p14:cNvPr id="31" name="Entrada de lápiz 30">
+                  <a:extLst>
+                    <a:ext uri="{FF2B5EF4-FFF2-40B4-BE49-F238E27FC236}">
+                      <a16:creationId xmlns:a16="http://schemas.microsoft.com/office/drawing/2014/main" id="{DAC02CF3-7CCF-371C-9FAD-58C78942A49C}"/>
+                    </a:ext>
+                  </a:extLst>
+                </p14:cNvPr>
+                <p14:cNvContentPartPr/>
+                <p14:nvPr/>
+              </p14:nvContentPartPr>
+              <p14:xfrm>
+                <a:off x="10439410" y="6495820"/>
+                <a:ext cx="360" cy="360"/>
+              </p14:xfrm>
+            </p:contentPart>
+          </mc:Choice>
+          <mc:Fallback>
+            <p:pic>
+              <p:nvPicPr>
+                <p:cNvPr id="31" name="Entrada de lápiz 30">
+                  <a:extLst>
+                    <a:ext uri="{FF2B5EF4-FFF2-40B4-BE49-F238E27FC236}">
+                      <a16:creationId xmlns:a16="http://schemas.microsoft.com/office/drawing/2014/main" id="{DAC02CF3-7CCF-371C-9FAD-58C78942A49C}"/>
+                    </a:ext>
+                  </a:extLst>
+                </p:cNvPr>
+                <p:cNvPicPr/>
+                <p:nvPr/>
+              </p:nvPicPr>
+              <p:blipFill>
+                <a:blip r:embed="rId8"/>
+                <a:stretch>
+                  <a:fillRect/>
+                </a:stretch>
+              </p:blipFill>
+              <p:spPr>
+                <a:xfrm>
+                  <a:off x="10376410" y="6433180"/>
+                  <a:ext cx="126000" cy="126000"/>
+                </a:xfrm>
+                <a:prstGeom prst="rect">
+                  <a:avLst/>
+                </a:prstGeom>
+              </p:spPr>
+            </p:pic>
+          </mc:Fallback>
+        </mc:AlternateContent>
+        <mc:AlternateContent xmlns:mc="http://schemas.openxmlformats.org/markup-compatibility/2006">
+          <mc:Choice xmlns:p14="http://schemas.microsoft.com/office/powerpoint/2010/main" Requires="p14">
+            <p:contentPart p14:bwMode="auto" r:id="rId31">
+              <p14:nvContentPartPr>
+                <p14:cNvPr id="33" name="Entrada de lápiz 32">
+                  <a:extLst>
+                    <a:ext uri="{FF2B5EF4-FFF2-40B4-BE49-F238E27FC236}">
+                      <a16:creationId xmlns:a16="http://schemas.microsoft.com/office/drawing/2014/main" id="{EC8C5973-B529-1A86-62D5-CD4FAB88FEE2}"/>
+                    </a:ext>
+                  </a:extLst>
+                </p14:cNvPr>
+                <p14:cNvContentPartPr/>
+                <p14:nvPr/>
+              </p14:nvContentPartPr>
+              <p14:xfrm>
+                <a:off x="10413850" y="6489340"/>
+                <a:ext cx="360" cy="360"/>
+              </p14:xfrm>
+            </p:contentPart>
+          </mc:Choice>
+          <mc:Fallback>
+            <p:pic>
+              <p:nvPicPr>
+                <p:cNvPr id="33" name="Entrada de lápiz 32">
+                  <a:extLst>
+                    <a:ext uri="{FF2B5EF4-FFF2-40B4-BE49-F238E27FC236}">
+                      <a16:creationId xmlns:a16="http://schemas.microsoft.com/office/drawing/2014/main" id="{EC8C5973-B529-1A86-62D5-CD4FAB88FEE2}"/>
+                    </a:ext>
+                  </a:extLst>
+                </p:cNvPr>
+                <p:cNvPicPr/>
+                <p:nvPr/>
+              </p:nvPicPr>
+              <p:blipFill>
+                <a:blip r:embed="rId8"/>
+                <a:stretch>
+                  <a:fillRect/>
+                </a:stretch>
+              </p:blipFill>
+              <p:spPr>
+                <a:xfrm>
+                  <a:off x="10350850" y="6426700"/>
+                  <a:ext cx="126000" cy="126000"/>
+                </a:xfrm>
+                <a:prstGeom prst="rect">
+                  <a:avLst/>
+                </a:prstGeom>
+              </p:spPr>
+            </p:pic>
+          </mc:Fallback>
+        </mc:AlternateContent>
+        <mc:AlternateContent xmlns:mc="http://schemas.openxmlformats.org/markup-compatibility/2006">
+          <mc:Choice xmlns:p14="http://schemas.microsoft.com/office/powerpoint/2010/main" Requires="p14">
+            <p:contentPart p14:bwMode="auto" r:id="rId32">
+              <p14:nvContentPartPr>
+                <p14:cNvPr id="35" name="Entrada de lápiz 34">
+                  <a:extLst>
+                    <a:ext uri="{FF2B5EF4-FFF2-40B4-BE49-F238E27FC236}">
+                      <a16:creationId xmlns:a16="http://schemas.microsoft.com/office/drawing/2014/main" id="{824B2246-D23F-103F-5B60-C4FCE45E3777}"/>
+                    </a:ext>
+                  </a:extLst>
+                </p14:cNvPr>
+                <p14:cNvContentPartPr/>
+                <p14:nvPr/>
+              </p14:nvContentPartPr>
+              <p14:xfrm>
+                <a:off x="10331410" y="6483220"/>
+                <a:ext cx="360" cy="360"/>
+              </p14:xfrm>
+            </p:contentPart>
+          </mc:Choice>
+          <mc:Fallback>
+            <p:pic>
+              <p:nvPicPr>
+                <p:cNvPr id="35" name="Entrada de lápiz 34">
+                  <a:extLst>
+                    <a:ext uri="{FF2B5EF4-FFF2-40B4-BE49-F238E27FC236}">
+                      <a16:creationId xmlns:a16="http://schemas.microsoft.com/office/drawing/2014/main" id="{824B2246-D23F-103F-5B60-C4FCE45E3777}"/>
+                    </a:ext>
+                  </a:extLst>
+                </p:cNvPr>
+                <p:cNvPicPr/>
+                <p:nvPr/>
+              </p:nvPicPr>
+              <p:blipFill>
+                <a:blip r:embed="rId8"/>
+                <a:stretch>
+                  <a:fillRect/>
+                </a:stretch>
+              </p:blipFill>
+              <p:spPr>
+                <a:xfrm>
+                  <a:off x="10268410" y="6420580"/>
+                  <a:ext cx="126000" cy="126000"/>
+                </a:xfrm>
+                <a:prstGeom prst="rect">
+                  <a:avLst/>
+                </a:prstGeom>
+              </p:spPr>
+            </p:pic>
+          </mc:Fallback>
+        </mc:AlternateContent>
+        <mc:AlternateContent xmlns:mc="http://schemas.openxmlformats.org/markup-compatibility/2006">
+          <mc:Choice xmlns:p14="http://schemas.microsoft.com/office/powerpoint/2010/main" Requires="p14">
+            <p:contentPart p14:bwMode="auto" r:id="rId33">
+              <p14:nvContentPartPr>
+                <p14:cNvPr id="36" name="Entrada de lápiz 35">
+                  <a:extLst>
+                    <a:ext uri="{FF2B5EF4-FFF2-40B4-BE49-F238E27FC236}">
+                      <a16:creationId xmlns:a16="http://schemas.microsoft.com/office/drawing/2014/main" id="{6A44E835-CC10-D2B2-1A90-D6390E5ED65C}"/>
+                    </a:ext>
+                  </a:extLst>
+                </p14:cNvPr>
+                <p14:cNvContentPartPr/>
+                <p14:nvPr/>
+              </p14:nvContentPartPr>
+              <p14:xfrm>
+                <a:off x="10255090" y="6501220"/>
+                <a:ext cx="360" cy="1440"/>
+              </p14:xfrm>
+            </p:contentPart>
+          </mc:Choice>
+          <mc:Fallback>
+            <p:pic>
+              <p:nvPicPr>
+                <p:cNvPr id="36" name="Entrada de lápiz 35">
+                  <a:extLst>
+                    <a:ext uri="{FF2B5EF4-FFF2-40B4-BE49-F238E27FC236}">
+                      <a16:creationId xmlns:a16="http://schemas.microsoft.com/office/drawing/2014/main" id="{6A44E835-CC10-D2B2-1A90-D6390E5ED65C}"/>
+                    </a:ext>
+                  </a:extLst>
+                </p:cNvPr>
+                <p:cNvPicPr/>
+                <p:nvPr/>
+              </p:nvPicPr>
+              <p:blipFill>
+                <a:blip r:embed="rId28"/>
+                <a:stretch>
+                  <a:fillRect/>
+                </a:stretch>
+              </p:blipFill>
+              <p:spPr>
+                <a:xfrm>
+                  <a:off x="10192450" y="6438220"/>
+                  <a:ext cx="126000" cy="127080"/>
+                </a:xfrm>
+                <a:prstGeom prst="rect">
+                  <a:avLst/>
+                </a:prstGeom>
+              </p:spPr>
+            </p:pic>
+          </mc:Fallback>
+        </mc:AlternateContent>
+        <mc:AlternateContent xmlns:mc="http://schemas.openxmlformats.org/markup-compatibility/2006">
+          <mc:Choice xmlns:p14="http://schemas.microsoft.com/office/powerpoint/2010/main" Requires="p14">
+            <p:contentPart p14:bwMode="auto" r:id="rId34">
+              <p14:nvContentPartPr>
+                <p14:cNvPr id="37" name="Entrada de lápiz 36">
+                  <a:extLst>
+                    <a:ext uri="{FF2B5EF4-FFF2-40B4-BE49-F238E27FC236}">
+                      <a16:creationId xmlns:a16="http://schemas.microsoft.com/office/drawing/2014/main" id="{2F8CA1CC-9C5B-7072-02F2-5F43E4FB97EB}"/>
+                    </a:ext>
+                  </a:extLst>
+                </p14:cNvPr>
+                <p14:cNvContentPartPr/>
+                <p14:nvPr/>
+              </p14:nvContentPartPr>
+              <p14:xfrm>
+                <a:off x="10242490" y="6476740"/>
+                <a:ext cx="360" cy="360"/>
+              </p14:xfrm>
+            </p:contentPart>
+          </mc:Choice>
+          <mc:Fallback>
+            <p:pic>
+              <p:nvPicPr>
+                <p:cNvPr id="37" name="Entrada de lápiz 36">
+                  <a:extLst>
+                    <a:ext uri="{FF2B5EF4-FFF2-40B4-BE49-F238E27FC236}">
+                      <a16:creationId xmlns:a16="http://schemas.microsoft.com/office/drawing/2014/main" id="{2F8CA1CC-9C5B-7072-02F2-5F43E4FB97EB}"/>
+                    </a:ext>
+                  </a:extLst>
+                </p:cNvPr>
+                <p:cNvPicPr/>
+                <p:nvPr/>
+              </p:nvPicPr>
+              <p:blipFill>
+                <a:blip r:embed="rId8"/>
+                <a:stretch>
+                  <a:fillRect/>
+                </a:stretch>
+              </p:blipFill>
+              <p:spPr>
+                <a:xfrm>
+                  <a:off x="10179490" y="6414100"/>
+                  <a:ext cx="126000" cy="126000"/>
+                </a:xfrm>
+                <a:prstGeom prst="rect">
+                  <a:avLst/>
+                </a:prstGeom>
+              </p:spPr>
+            </p:pic>
+          </mc:Fallback>
+        </mc:AlternateContent>
+        <mc:AlternateContent xmlns:mc="http://schemas.openxmlformats.org/markup-compatibility/2006">
+          <mc:Choice xmlns:p14="http://schemas.microsoft.com/office/powerpoint/2010/main" Requires="p14">
+            <p:contentPart p14:bwMode="auto" r:id="rId35">
+              <p14:nvContentPartPr>
+                <p14:cNvPr id="38" name="Entrada de lápiz 37">
+                  <a:extLst>
+                    <a:ext uri="{FF2B5EF4-FFF2-40B4-BE49-F238E27FC236}">
+                      <a16:creationId xmlns:a16="http://schemas.microsoft.com/office/drawing/2014/main" id="{4ECB6957-AFC5-41EE-1E78-90299131AD26}"/>
+                    </a:ext>
+                  </a:extLst>
+                </p14:cNvPr>
+                <p14:cNvContentPartPr/>
+                <p14:nvPr/>
+              </p14:nvContentPartPr>
+              <p14:xfrm>
+                <a:off x="10216930" y="6495820"/>
+                <a:ext cx="360" cy="360"/>
+              </p14:xfrm>
+            </p:contentPart>
+          </mc:Choice>
+          <mc:Fallback>
+            <p:pic>
+              <p:nvPicPr>
+                <p:cNvPr id="38" name="Entrada de lápiz 37">
+                  <a:extLst>
+                    <a:ext uri="{FF2B5EF4-FFF2-40B4-BE49-F238E27FC236}">
+                      <a16:creationId xmlns:a16="http://schemas.microsoft.com/office/drawing/2014/main" id="{4ECB6957-AFC5-41EE-1E78-90299131AD26}"/>
+                    </a:ext>
+                  </a:extLst>
+                </p:cNvPr>
+                <p:cNvPicPr/>
+                <p:nvPr/>
+              </p:nvPicPr>
+              <p:blipFill>
+                <a:blip r:embed="rId8"/>
+                <a:stretch>
+                  <a:fillRect/>
+                </a:stretch>
+              </p:blipFill>
+              <p:spPr>
+                <a:xfrm>
+                  <a:off x="10154290" y="6433180"/>
+                  <a:ext cx="126000" cy="126000"/>
+                </a:xfrm>
+                <a:prstGeom prst="rect">
+                  <a:avLst/>
+                </a:prstGeom>
+              </p:spPr>
+            </p:pic>
+          </mc:Fallback>
+        </mc:AlternateContent>
+        <mc:AlternateContent xmlns:mc="http://schemas.openxmlformats.org/markup-compatibility/2006">
+          <mc:Choice xmlns:p14="http://schemas.microsoft.com/office/powerpoint/2010/main" Requires="p14">
+            <p:contentPart p14:bwMode="auto" r:id="rId36">
+              <p14:nvContentPartPr>
+                <p14:cNvPr id="39" name="Entrada de lápiz 38">
+                  <a:extLst>
+                    <a:ext uri="{FF2B5EF4-FFF2-40B4-BE49-F238E27FC236}">
+                      <a16:creationId xmlns:a16="http://schemas.microsoft.com/office/drawing/2014/main" id="{11B6FF7A-106B-782A-92CF-AC051441D186}"/>
+                    </a:ext>
+                  </a:extLst>
+                </p14:cNvPr>
+                <p14:cNvContentPartPr/>
+                <p14:nvPr/>
+              </p14:nvContentPartPr>
+              <p14:xfrm>
+                <a:off x="10178770" y="6476740"/>
+                <a:ext cx="360" cy="360"/>
+              </p14:xfrm>
+            </p:contentPart>
+          </mc:Choice>
+          <mc:Fallback>
+            <p:pic>
+              <p:nvPicPr>
+                <p:cNvPr id="39" name="Entrada de lápiz 38">
+                  <a:extLst>
+                    <a:ext uri="{FF2B5EF4-FFF2-40B4-BE49-F238E27FC236}">
+                      <a16:creationId xmlns:a16="http://schemas.microsoft.com/office/drawing/2014/main" id="{11B6FF7A-106B-782A-92CF-AC051441D186}"/>
+                    </a:ext>
+                  </a:extLst>
+                </p:cNvPr>
+                <p:cNvPicPr/>
+                <p:nvPr/>
+              </p:nvPicPr>
+              <p:blipFill>
+                <a:blip r:embed="rId8"/>
+                <a:stretch>
+                  <a:fillRect/>
+                </a:stretch>
+              </p:blipFill>
+              <p:spPr>
+                <a:xfrm>
+                  <a:off x="10116130" y="6414100"/>
+                  <a:ext cx="126000" cy="126000"/>
+                </a:xfrm>
+                <a:prstGeom prst="rect">
+                  <a:avLst/>
+                </a:prstGeom>
+              </p:spPr>
+            </p:pic>
+          </mc:Fallback>
+        </mc:AlternateContent>
+      </p:grpSp>
     </p:spTree>
   </p:cSld>
   <p:clrMapOvr>
@@ -18899,7 +20912,7 @@
         </p:nvSpPr>
         <p:spPr>
           <a:xfrm>
-            <a:off x="716902" y="1719418"/>
+            <a:off x="659752" y="1954368"/>
             <a:ext cx="10743578" cy="2554505"/>
           </a:xfrm>
           <a:prstGeom prst="rect">
@@ -19085,186 +21098,6 @@
           </a:p>
         </p:txBody>
       </p:sp>
-      <p:pic>
-        <p:nvPicPr>
-          <p:cNvPr id="7" name="Picture 4">
-            <a:extLst>
-              <a:ext uri="{FF2B5EF4-FFF2-40B4-BE49-F238E27FC236}">
-                <a16:creationId xmlns:a16="http://schemas.microsoft.com/office/drawing/2014/main" id="{AE192DB4-09AB-4DFB-AC50-EE57C749C795}"/>
-              </a:ext>
-            </a:extLst>
-          </p:cNvPr>
-          <p:cNvPicPr>
-            <a:picLocks noChangeAspect="1" noChangeArrowheads="1"/>
-          </p:cNvPicPr>
-          <p:nvPr/>
-        </p:nvPicPr>
-        <p:blipFill>
-          <a:blip r:embed="rId4">
-            <a:extLst>
-              <a:ext uri="{28A0092B-C50C-407E-A947-70E740481C1C}">
-                <a14:useLocalDpi xmlns:a14="http://schemas.microsoft.com/office/drawing/2010/main" val="0"/>
-              </a:ext>
-            </a:extLst>
-          </a:blip>
-          <a:srcRect/>
-          <a:stretch>
-            <a:fillRect/>
-          </a:stretch>
-        </p:blipFill>
-        <p:spPr bwMode="auto">
-          <a:xfrm>
-            <a:off x="743491" y="4377686"/>
-            <a:ext cx="2768462" cy="2080800"/>
-          </a:xfrm>
-          <a:prstGeom prst="rect">
-            <a:avLst/>
-          </a:prstGeom>
-          <a:noFill/>
-          <a:ln>
-            <a:noFill/>
-          </a:ln>
-          <a:extLst>
-            <a:ext uri="{909E8E84-426E-40DD-AFC4-6F175D3DCCD1}">
-              <a14:hiddenFill xmlns:a14="http://schemas.microsoft.com/office/drawing/2010/main">
-                <a:solidFill>
-                  <a:srgbClr val="FFFFFF"/>
-                </a:solidFill>
-              </a14:hiddenFill>
-            </a:ext>
-            <a:ext uri="{91240B29-F687-4F45-9708-019B960494DF}">
-              <a14:hiddenLine xmlns:a14="http://schemas.microsoft.com/office/drawing/2010/main" w="12700" cap="flat">
-                <a:solidFill>
-                  <a:srgbClr val="000000"/>
-                </a:solidFill>
-                <a:miter lim="800000"/>
-                <a:headEnd/>
-                <a:tailEnd/>
-              </a14:hiddenLine>
-            </a:ext>
-          </a:extLst>
-        </p:spPr>
-      </p:pic>
-      <p:pic>
-        <p:nvPicPr>
-          <p:cNvPr id="8" name="Picture 5">
-            <a:extLst>
-              <a:ext uri="{FF2B5EF4-FFF2-40B4-BE49-F238E27FC236}">
-                <a16:creationId xmlns:a16="http://schemas.microsoft.com/office/drawing/2014/main" id="{051E9C04-0571-47F3-9A7C-61C7672C21FA}"/>
-              </a:ext>
-            </a:extLst>
-          </p:cNvPr>
-          <p:cNvPicPr>
-            <a:picLocks noChangeAspect="1" noChangeArrowheads="1"/>
-          </p:cNvPicPr>
-          <p:nvPr/>
-        </p:nvPicPr>
-        <p:blipFill>
-          <a:blip r:embed="rId5">
-            <a:extLst>
-              <a:ext uri="{28A0092B-C50C-407E-A947-70E740481C1C}">
-                <a14:useLocalDpi xmlns:a14="http://schemas.microsoft.com/office/drawing/2010/main" val="0"/>
-              </a:ext>
-            </a:extLst>
-          </a:blip>
-          <a:srcRect/>
-          <a:stretch>
-            <a:fillRect/>
-          </a:stretch>
-        </p:blipFill>
-        <p:spPr bwMode="auto">
-          <a:xfrm>
-            <a:off x="8685508" y="4418961"/>
-            <a:ext cx="2769641" cy="2080800"/>
-          </a:xfrm>
-          <a:prstGeom prst="rect">
-            <a:avLst/>
-          </a:prstGeom>
-          <a:noFill/>
-          <a:ln>
-            <a:noFill/>
-          </a:ln>
-          <a:extLst>
-            <a:ext uri="{909E8E84-426E-40DD-AFC4-6F175D3DCCD1}">
-              <a14:hiddenFill xmlns:a14="http://schemas.microsoft.com/office/drawing/2010/main">
-                <a:solidFill>
-                  <a:srgbClr val="FFFFFF"/>
-                </a:solidFill>
-              </a14:hiddenFill>
-            </a:ext>
-            <a:ext uri="{91240B29-F687-4F45-9708-019B960494DF}">
-              <a14:hiddenLine xmlns:a14="http://schemas.microsoft.com/office/drawing/2010/main" w="12700" cap="flat">
-                <a:solidFill>
-                  <a:srgbClr val="000000"/>
-                </a:solidFill>
-                <a:miter lim="800000"/>
-                <a:headEnd/>
-                <a:tailEnd/>
-              </a14:hiddenLine>
-            </a:ext>
-          </a:extLst>
-        </p:spPr>
-      </p:pic>
-      <p:pic>
-        <p:nvPicPr>
-          <p:cNvPr id="9" name="Picture 6">
-            <a:extLst>
-              <a:ext uri="{FF2B5EF4-FFF2-40B4-BE49-F238E27FC236}">
-                <a16:creationId xmlns:a16="http://schemas.microsoft.com/office/drawing/2014/main" id="{4E88B9A8-A5FF-49D9-95C4-0DEE4C6D3358}"/>
-              </a:ext>
-            </a:extLst>
-          </p:cNvPr>
-          <p:cNvPicPr>
-            <a:picLocks noChangeAspect="1" noChangeArrowheads="1"/>
-          </p:cNvPicPr>
-          <p:nvPr/>
-        </p:nvPicPr>
-        <p:blipFill>
-          <a:blip r:embed="rId6">
-            <a:extLst>
-              <a:ext uri="{28A0092B-C50C-407E-A947-70E740481C1C}">
-                <a14:useLocalDpi xmlns:a14="http://schemas.microsoft.com/office/drawing/2010/main" val="0"/>
-              </a:ext>
-            </a:extLst>
-          </a:blip>
-          <a:srcRect/>
-          <a:stretch>
-            <a:fillRect/>
-          </a:stretch>
-        </p:blipFill>
-        <p:spPr bwMode="auto">
-          <a:xfrm>
-            <a:off x="4790292" y="4418961"/>
-            <a:ext cx="2769641" cy="2080800"/>
-          </a:xfrm>
-          <a:prstGeom prst="rect">
-            <a:avLst/>
-          </a:prstGeom>
-          <a:noFill/>
-          <a:ln>
-            <a:noFill/>
-          </a:ln>
-          <a:extLst>
-            <a:ext uri="{909E8E84-426E-40DD-AFC4-6F175D3DCCD1}">
-              <a14:hiddenFill xmlns:a14="http://schemas.microsoft.com/office/drawing/2010/main">
-                <a:solidFill>
-                  <a:srgbClr val="FFFFFF"/>
-                </a:solidFill>
-              </a14:hiddenFill>
-            </a:ext>
-            <a:ext uri="{91240B29-F687-4F45-9708-019B960494DF}">
-              <a14:hiddenLine xmlns:a14="http://schemas.microsoft.com/office/drawing/2010/main" w="12700" cap="flat">
-                <a:solidFill>
-                  <a:srgbClr val="000000"/>
-                </a:solidFill>
-                <a:miter lim="800000"/>
-                <a:headEnd/>
-                <a:tailEnd/>
-              </a14:hiddenLine>
-            </a:ext>
-          </a:extLst>
-        </p:spPr>
-      </p:pic>
     </p:spTree>
     <p:extLst>
       <p:ext uri="{BB962C8B-B14F-4D97-AF65-F5344CB8AC3E}">

</xml_diff>